<commit_message>
AH - updated pptx
</commit_message>
<xml_diff>
--- a/Crime_Victoria_PowerPoint_Presentation_temporary_Anh.pptx
+++ b/Crime_Victoria_PowerPoint_Presentation_temporary_Anh.pptx
@@ -115,7 +115,7 @@
   </p:defaultTextStyle>
   <p:extLst>
     <p:ext uri="{EFAFB233-063F-42B5-8137-9DF3F51BA10A}">
-      <p15:sldGuideLst xmlns:p15="http://schemas.microsoft.com/office/powerpoint/2012/main" xmlns=""/>
+      <p15:sldGuideLst xmlns="" xmlns:p15="http://schemas.microsoft.com/office/powerpoint/2012/main"/>
     </p:ext>
   </p:extLst>
 </p:presentation>
@@ -373,7 +373,7 @@
     </p:spTree>
     <p:extLst>
       <p:ext uri="{BB962C8B-B14F-4D97-AF65-F5344CB8AC3E}">
-        <p14:creationId xmlns:p14="http://schemas.microsoft.com/office/powerpoint/2010/main" xmlns="" val="1356543397"/>
+        <p14:creationId xmlns="" xmlns:p14="http://schemas.microsoft.com/office/powerpoint/2010/main" val="1356543397"/>
       </p:ext>
     </p:extLst>
   </p:cSld>
@@ -495,7 +495,7 @@
           <p:cNvPr id="2" name="Title 1">
             <a:extLst>
               <a:ext uri="{FF2B5EF4-FFF2-40B4-BE49-F238E27FC236}">
-                <a16:creationId xmlns:a16="http://schemas.microsoft.com/office/drawing/2014/main" xmlns="" id="{0D395C89-2E28-4777-95B0-BA7EECAE3BA4}"/>
+                <a16:creationId xmlns="" xmlns:a16="http://schemas.microsoft.com/office/drawing/2014/main" id="{0D395C89-2E28-4777-95B0-BA7EECAE3BA4}"/>
               </a:ext>
             </a:extLst>
           </p:cNvPr>
@@ -534,7 +534,7 @@
           <p:cNvPr id="3" name="Subtitle 2">
             <a:extLst>
               <a:ext uri="{FF2B5EF4-FFF2-40B4-BE49-F238E27FC236}">
-                <a16:creationId xmlns:a16="http://schemas.microsoft.com/office/drawing/2014/main" xmlns="" id="{59052321-4D71-4DA8-BD2C-DC22FC1525CB}"/>
+                <a16:creationId xmlns="" xmlns:a16="http://schemas.microsoft.com/office/drawing/2014/main" id="{59052321-4D71-4DA8-BD2C-DC22FC1525CB}"/>
               </a:ext>
             </a:extLst>
           </p:cNvPr>
@@ -606,7 +606,7 @@
           <p:cNvPr id="4" name="Date Placeholder 3">
             <a:extLst>
               <a:ext uri="{FF2B5EF4-FFF2-40B4-BE49-F238E27FC236}">
-                <a16:creationId xmlns:a16="http://schemas.microsoft.com/office/drawing/2014/main" xmlns="" id="{B1D37183-71EA-4A92-8609-41ECB53F447E}"/>
+                <a16:creationId xmlns="" xmlns:a16="http://schemas.microsoft.com/office/drawing/2014/main" id="{B1D37183-71EA-4A92-8609-41ECB53F447E}"/>
               </a:ext>
             </a:extLst>
           </p:cNvPr>
@@ -636,7 +636,7 @@
           <p:cNvPr id="5" name="Footer Placeholder 4">
             <a:extLst>
               <a:ext uri="{FF2B5EF4-FFF2-40B4-BE49-F238E27FC236}">
-                <a16:creationId xmlns:a16="http://schemas.microsoft.com/office/drawing/2014/main" xmlns="" id="{CA09F2E6-1ECC-4081-8EBF-C80C6C94A105}"/>
+                <a16:creationId xmlns="" xmlns:a16="http://schemas.microsoft.com/office/drawing/2014/main" id="{CA09F2E6-1ECC-4081-8EBF-C80C6C94A105}"/>
               </a:ext>
             </a:extLst>
           </p:cNvPr>
@@ -661,7 +661,7 @@
           <p:cNvPr id="6" name="Slide Number Placeholder 5">
             <a:extLst>
               <a:ext uri="{FF2B5EF4-FFF2-40B4-BE49-F238E27FC236}">
-                <a16:creationId xmlns:a16="http://schemas.microsoft.com/office/drawing/2014/main" xmlns="" id="{31C3FA67-CD72-4503-BA25-FEC880107BC4}"/>
+                <a16:creationId xmlns="" xmlns:a16="http://schemas.microsoft.com/office/drawing/2014/main" id="{31C3FA67-CD72-4503-BA25-FEC880107BC4}"/>
               </a:ext>
             </a:extLst>
           </p:cNvPr>
@@ -689,7 +689,7 @@
     </p:spTree>
     <p:extLst>
       <p:ext uri="{BB962C8B-B14F-4D97-AF65-F5344CB8AC3E}">
-        <p14:creationId xmlns:p14="http://schemas.microsoft.com/office/powerpoint/2010/main" xmlns="" val="3194522138"/>
+        <p14:creationId xmlns="" xmlns:p14="http://schemas.microsoft.com/office/powerpoint/2010/main" val="3194522138"/>
       </p:ext>
     </p:extLst>
   </p:cSld>
@@ -721,7 +721,7 @@
           <p:cNvPr id="2" name="Title 1">
             <a:extLst>
               <a:ext uri="{FF2B5EF4-FFF2-40B4-BE49-F238E27FC236}">
-                <a16:creationId xmlns:a16="http://schemas.microsoft.com/office/drawing/2014/main" xmlns="" id="{0C683CBE-1EA9-4E8B-A281-C50B792E55F5}"/>
+                <a16:creationId xmlns="" xmlns:a16="http://schemas.microsoft.com/office/drawing/2014/main" id="{0C683CBE-1EA9-4E8B-A281-C50B792E55F5}"/>
               </a:ext>
             </a:extLst>
           </p:cNvPr>
@@ -749,7 +749,7 @@
           <p:cNvPr id="3" name="Vertical Text Placeholder 2">
             <a:extLst>
               <a:ext uri="{FF2B5EF4-FFF2-40B4-BE49-F238E27FC236}">
-                <a16:creationId xmlns:a16="http://schemas.microsoft.com/office/drawing/2014/main" xmlns="" id="{8B2EB1A0-A59D-4CB9-BABB-C6BF1D2E9928}"/>
+                <a16:creationId xmlns="" xmlns:a16="http://schemas.microsoft.com/office/drawing/2014/main" id="{8B2EB1A0-A59D-4CB9-BABB-C6BF1D2E9928}"/>
               </a:ext>
             </a:extLst>
           </p:cNvPr>
@@ -806,7 +806,7 @@
           <p:cNvPr id="4" name="Date Placeholder 3">
             <a:extLst>
               <a:ext uri="{FF2B5EF4-FFF2-40B4-BE49-F238E27FC236}">
-                <a16:creationId xmlns:a16="http://schemas.microsoft.com/office/drawing/2014/main" xmlns="" id="{B2E6265B-940D-433C-AD76-2D6A42449307}"/>
+                <a16:creationId xmlns="" xmlns:a16="http://schemas.microsoft.com/office/drawing/2014/main" id="{B2E6265B-940D-433C-AD76-2D6A42449307}"/>
               </a:ext>
             </a:extLst>
           </p:cNvPr>
@@ -836,7 +836,7 @@
           <p:cNvPr id="5" name="Footer Placeholder 4">
             <a:extLst>
               <a:ext uri="{FF2B5EF4-FFF2-40B4-BE49-F238E27FC236}">
-                <a16:creationId xmlns:a16="http://schemas.microsoft.com/office/drawing/2014/main" xmlns="" id="{EDCAB98E-314F-45C4-9A64-AD3FAE0516DC}"/>
+                <a16:creationId xmlns="" xmlns:a16="http://schemas.microsoft.com/office/drawing/2014/main" id="{EDCAB98E-314F-45C4-9A64-AD3FAE0516DC}"/>
               </a:ext>
             </a:extLst>
           </p:cNvPr>
@@ -861,7 +861,7 @@
           <p:cNvPr id="6" name="Slide Number Placeholder 5">
             <a:extLst>
               <a:ext uri="{FF2B5EF4-FFF2-40B4-BE49-F238E27FC236}">
-                <a16:creationId xmlns:a16="http://schemas.microsoft.com/office/drawing/2014/main" xmlns="" id="{58E49F32-B214-4A0C-8669-7FE4BA445965}"/>
+                <a16:creationId xmlns="" xmlns:a16="http://schemas.microsoft.com/office/drawing/2014/main" id="{58E49F32-B214-4A0C-8669-7FE4BA445965}"/>
               </a:ext>
             </a:extLst>
           </p:cNvPr>
@@ -889,7 +889,7 @@
     </p:spTree>
     <p:extLst>
       <p:ext uri="{BB962C8B-B14F-4D97-AF65-F5344CB8AC3E}">
-        <p14:creationId xmlns:p14="http://schemas.microsoft.com/office/powerpoint/2010/main" xmlns="" val="4203691493"/>
+        <p14:creationId xmlns="" xmlns:p14="http://schemas.microsoft.com/office/powerpoint/2010/main" val="4203691493"/>
       </p:ext>
     </p:extLst>
   </p:cSld>
@@ -921,7 +921,7 @@
           <p:cNvPr id="2" name="Vertical Title 1">
             <a:extLst>
               <a:ext uri="{FF2B5EF4-FFF2-40B4-BE49-F238E27FC236}">
-                <a16:creationId xmlns:a16="http://schemas.microsoft.com/office/drawing/2014/main" xmlns="" id="{18DE4A6D-DAA1-4551-A093-3C36C1C8CF36}"/>
+                <a16:creationId xmlns="" xmlns:a16="http://schemas.microsoft.com/office/drawing/2014/main" id="{18DE4A6D-DAA1-4551-A093-3C36C1C8CF36}"/>
               </a:ext>
             </a:extLst>
           </p:cNvPr>
@@ -954,7 +954,7 @@
           <p:cNvPr id="3" name="Vertical Text Placeholder 2">
             <a:extLst>
               <a:ext uri="{FF2B5EF4-FFF2-40B4-BE49-F238E27FC236}">
-                <a16:creationId xmlns:a16="http://schemas.microsoft.com/office/drawing/2014/main" xmlns="" id="{3125FDA9-71CD-4B86-B291-BEBA43D8ED7F}"/>
+                <a16:creationId xmlns="" xmlns:a16="http://schemas.microsoft.com/office/drawing/2014/main" id="{3125FDA9-71CD-4B86-B291-BEBA43D8ED7F}"/>
               </a:ext>
             </a:extLst>
           </p:cNvPr>
@@ -1016,7 +1016,7 @@
           <p:cNvPr id="4" name="Date Placeholder 3">
             <a:extLst>
               <a:ext uri="{FF2B5EF4-FFF2-40B4-BE49-F238E27FC236}">
-                <a16:creationId xmlns:a16="http://schemas.microsoft.com/office/drawing/2014/main" xmlns="" id="{86D9F5B1-B635-4479-A426-B1D4066502DB}"/>
+                <a16:creationId xmlns="" xmlns:a16="http://schemas.microsoft.com/office/drawing/2014/main" id="{86D9F5B1-B635-4479-A426-B1D4066502DB}"/>
               </a:ext>
             </a:extLst>
           </p:cNvPr>
@@ -1046,7 +1046,7 @@
           <p:cNvPr id="5" name="Footer Placeholder 4">
             <a:extLst>
               <a:ext uri="{FF2B5EF4-FFF2-40B4-BE49-F238E27FC236}">
-                <a16:creationId xmlns:a16="http://schemas.microsoft.com/office/drawing/2014/main" xmlns="" id="{6B833098-8769-47C3-80B2-C2942F984D68}"/>
+                <a16:creationId xmlns="" xmlns:a16="http://schemas.microsoft.com/office/drawing/2014/main" id="{6B833098-8769-47C3-80B2-C2942F984D68}"/>
               </a:ext>
             </a:extLst>
           </p:cNvPr>
@@ -1071,7 +1071,7 @@
           <p:cNvPr id="6" name="Slide Number Placeholder 5">
             <a:extLst>
               <a:ext uri="{FF2B5EF4-FFF2-40B4-BE49-F238E27FC236}">
-                <a16:creationId xmlns:a16="http://schemas.microsoft.com/office/drawing/2014/main" xmlns="" id="{E5EA9297-65D4-45BE-BE6C-5531FC6A5E1E}"/>
+                <a16:creationId xmlns="" xmlns:a16="http://schemas.microsoft.com/office/drawing/2014/main" id="{E5EA9297-65D4-45BE-BE6C-5531FC6A5E1E}"/>
               </a:ext>
             </a:extLst>
           </p:cNvPr>
@@ -1099,7 +1099,7 @@
     </p:spTree>
     <p:extLst>
       <p:ext uri="{BB962C8B-B14F-4D97-AF65-F5344CB8AC3E}">
-        <p14:creationId xmlns:p14="http://schemas.microsoft.com/office/powerpoint/2010/main" xmlns="" val="3777652632"/>
+        <p14:creationId xmlns="" xmlns:p14="http://schemas.microsoft.com/office/powerpoint/2010/main" val="3777652632"/>
       </p:ext>
     </p:extLst>
   </p:cSld>
@@ -1131,7 +1131,7 @@
           <p:cNvPr id="2" name="Title 1">
             <a:extLst>
               <a:ext uri="{FF2B5EF4-FFF2-40B4-BE49-F238E27FC236}">
-                <a16:creationId xmlns:a16="http://schemas.microsoft.com/office/drawing/2014/main" xmlns="" id="{DC9BA523-EF01-4656-9D54-347E984FD329}"/>
+                <a16:creationId xmlns="" xmlns:a16="http://schemas.microsoft.com/office/drawing/2014/main" id="{DC9BA523-EF01-4656-9D54-347E984FD329}"/>
               </a:ext>
             </a:extLst>
           </p:cNvPr>
@@ -1159,7 +1159,7 @@
           <p:cNvPr id="3" name="Content Placeholder 2">
             <a:extLst>
               <a:ext uri="{FF2B5EF4-FFF2-40B4-BE49-F238E27FC236}">
-                <a16:creationId xmlns:a16="http://schemas.microsoft.com/office/drawing/2014/main" xmlns="" id="{2AD52871-79D5-420E-8207-BEF7BE44A9B6}"/>
+                <a16:creationId xmlns="" xmlns:a16="http://schemas.microsoft.com/office/drawing/2014/main" id="{2AD52871-79D5-420E-8207-BEF7BE44A9B6}"/>
               </a:ext>
             </a:extLst>
           </p:cNvPr>
@@ -1216,7 +1216,7 @@
           <p:cNvPr id="4" name="Date Placeholder 3">
             <a:extLst>
               <a:ext uri="{FF2B5EF4-FFF2-40B4-BE49-F238E27FC236}">
-                <a16:creationId xmlns:a16="http://schemas.microsoft.com/office/drawing/2014/main" xmlns="" id="{896D32D3-8223-4851-BB8E-CB489B975FD6}"/>
+                <a16:creationId xmlns="" xmlns:a16="http://schemas.microsoft.com/office/drawing/2014/main" id="{896D32D3-8223-4851-BB8E-CB489B975FD6}"/>
               </a:ext>
             </a:extLst>
           </p:cNvPr>
@@ -1246,7 +1246,7 @@
           <p:cNvPr id="5" name="Footer Placeholder 4">
             <a:extLst>
               <a:ext uri="{FF2B5EF4-FFF2-40B4-BE49-F238E27FC236}">
-                <a16:creationId xmlns:a16="http://schemas.microsoft.com/office/drawing/2014/main" xmlns="" id="{9E94444B-9FC3-414D-8EA0-15AB806D5E32}"/>
+                <a16:creationId xmlns="" xmlns:a16="http://schemas.microsoft.com/office/drawing/2014/main" id="{9E94444B-9FC3-414D-8EA0-15AB806D5E32}"/>
               </a:ext>
             </a:extLst>
           </p:cNvPr>
@@ -1271,7 +1271,7 @@
           <p:cNvPr id="6" name="Slide Number Placeholder 5">
             <a:extLst>
               <a:ext uri="{FF2B5EF4-FFF2-40B4-BE49-F238E27FC236}">
-                <a16:creationId xmlns:a16="http://schemas.microsoft.com/office/drawing/2014/main" xmlns="" id="{DBBC448B-FCF6-40C5-8BB6-15B70E8897CB}"/>
+                <a16:creationId xmlns="" xmlns:a16="http://schemas.microsoft.com/office/drawing/2014/main" id="{DBBC448B-FCF6-40C5-8BB6-15B70E8897CB}"/>
               </a:ext>
             </a:extLst>
           </p:cNvPr>
@@ -1299,7 +1299,7 @@
     </p:spTree>
     <p:extLst>
       <p:ext uri="{BB962C8B-B14F-4D97-AF65-F5344CB8AC3E}">
-        <p14:creationId xmlns:p14="http://schemas.microsoft.com/office/powerpoint/2010/main" xmlns="" val="1938834610"/>
+        <p14:creationId xmlns="" xmlns:p14="http://schemas.microsoft.com/office/powerpoint/2010/main" val="1938834610"/>
       </p:ext>
     </p:extLst>
   </p:cSld>
@@ -1331,7 +1331,7 @@
           <p:cNvPr id="2" name="Title 1">
             <a:extLst>
               <a:ext uri="{FF2B5EF4-FFF2-40B4-BE49-F238E27FC236}">
-                <a16:creationId xmlns:a16="http://schemas.microsoft.com/office/drawing/2014/main" xmlns="" id="{D14F79BA-620F-4443-807B-BE44F36F98F1}"/>
+                <a16:creationId xmlns="" xmlns:a16="http://schemas.microsoft.com/office/drawing/2014/main" id="{D14F79BA-620F-4443-807B-BE44F36F98F1}"/>
               </a:ext>
             </a:extLst>
           </p:cNvPr>
@@ -1370,7 +1370,7 @@
           <p:cNvPr id="3" name="Text Placeholder 2">
             <a:extLst>
               <a:ext uri="{FF2B5EF4-FFF2-40B4-BE49-F238E27FC236}">
-                <a16:creationId xmlns:a16="http://schemas.microsoft.com/office/drawing/2014/main" xmlns="" id="{30C9A625-6442-4047-B545-433C4451210A}"/>
+                <a16:creationId xmlns="" xmlns:a16="http://schemas.microsoft.com/office/drawing/2014/main" id="{30C9A625-6442-4047-B545-433C4451210A}"/>
               </a:ext>
             </a:extLst>
           </p:cNvPr>
@@ -1495,7 +1495,7 @@
           <p:cNvPr id="4" name="Date Placeholder 3">
             <a:extLst>
               <a:ext uri="{FF2B5EF4-FFF2-40B4-BE49-F238E27FC236}">
-                <a16:creationId xmlns:a16="http://schemas.microsoft.com/office/drawing/2014/main" xmlns="" id="{5F8EAA30-3B1A-4BEA-9835-33D2072451F9}"/>
+                <a16:creationId xmlns="" xmlns:a16="http://schemas.microsoft.com/office/drawing/2014/main" id="{5F8EAA30-3B1A-4BEA-9835-33D2072451F9}"/>
               </a:ext>
             </a:extLst>
           </p:cNvPr>
@@ -1525,7 +1525,7 @@
           <p:cNvPr id="5" name="Footer Placeholder 4">
             <a:extLst>
               <a:ext uri="{FF2B5EF4-FFF2-40B4-BE49-F238E27FC236}">
-                <a16:creationId xmlns:a16="http://schemas.microsoft.com/office/drawing/2014/main" xmlns="" id="{BB256440-3149-446F-8105-485333B183A0}"/>
+                <a16:creationId xmlns="" xmlns:a16="http://schemas.microsoft.com/office/drawing/2014/main" id="{BB256440-3149-446F-8105-485333B183A0}"/>
               </a:ext>
             </a:extLst>
           </p:cNvPr>
@@ -1550,7 +1550,7 @@
           <p:cNvPr id="6" name="Slide Number Placeholder 5">
             <a:extLst>
               <a:ext uri="{FF2B5EF4-FFF2-40B4-BE49-F238E27FC236}">
-                <a16:creationId xmlns:a16="http://schemas.microsoft.com/office/drawing/2014/main" xmlns="" id="{4E0FEDB1-D604-4E10-B334-5DB303498B12}"/>
+                <a16:creationId xmlns="" xmlns:a16="http://schemas.microsoft.com/office/drawing/2014/main" id="{4E0FEDB1-D604-4E10-B334-5DB303498B12}"/>
               </a:ext>
             </a:extLst>
           </p:cNvPr>
@@ -1578,7 +1578,7 @@
     </p:spTree>
     <p:extLst>
       <p:ext uri="{BB962C8B-B14F-4D97-AF65-F5344CB8AC3E}">
-        <p14:creationId xmlns:p14="http://schemas.microsoft.com/office/powerpoint/2010/main" xmlns="" val="1320324372"/>
+        <p14:creationId xmlns="" xmlns:p14="http://schemas.microsoft.com/office/powerpoint/2010/main" val="1320324372"/>
       </p:ext>
     </p:extLst>
   </p:cSld>
@@ -1610,7 +1610,7 @@
           <p:cNvPr id="2" name="Title 1">
             <a:extLst>
               <a:ext uri="{FF2B5EF4-FFF2-40B4-BE49-F238E27FC236}">
-                <a16:creationId xmlns:a16="http://schemas.microsoft.com/office/drawing/2014/main" xmlns="" id="{56F6E563-D552-439E-8DF5-45062D87549B}"/>
+                <a16:creationId xmlns="" xmlns:a16="http://schemas.microsoft.com/office/drawing/2014/main" id="{56F6E563-D552-439E-8DF5-45062D87549B}"/>
               </a:ext>
             </a:extLst>
           </p:cNvPr>
@@ -1638,7 +1638,7 @@
           <p:cNvPr id="3" name="Content Placeholder 2">
             <a:extLst>
               <a:ext uri="{FF2B5EF4-FFF2-40B4-BE49-F238E27FC236}">
-                <a16:creationId xmlns:a16="http://schemas.microsoft.com/office/drawing/2014/main" xmlns="" id="{C0136873-2DD5-456E-A3A9-FE408419E30D}"/>
+                <a16:creationId xmlns="" xmlns:a16="http://schemas.microsoft.com/office/drawing/2014/main" id="{C0136873-2DD5-456E-A3A9-FE408419E30D}"/>
               </a:ext>
             </a:extLst>
           </p:cNvPr>
@@ -1700,7 +1700,7 @@
           <p:cNvPr id="4" name="Content Placeholder 3">
             <a:extLst>
               <a:ext uri="{FF2B5EF4-FFF2-40B4-BE49-F238E27FC236}">
-                <a16:creationId xmlns:a16="http://schemas.microsoft.com/office/drawing/2014/main" xmlns="" id="{00C6B04C-FB9E-4A9E-8892-4B5B702898B4}"/>
+                <a16:creationId xmlns="" xmlns:a16="http://schemas.microsoft.com/office/drawing/2014/main" id="{00C6B04C-FB9E-4A9E-8892-4B5B702898B4}"/>
               </a:ext>
             </a:extLst>
           </p:cNvPr>
@@ -1762,7 +1762,7 @@
           <p:cNvPr id="5" name="Date Placeholder 4">
             <a:extLst>
               <a:ext uri="{FF2B5EF4-FFF2-40B4-BE49-F238E27FC236}">
-                <a16:creationId xmlns:a16="http://schemas.microsoft.com/office/drawing/2014/main" xmlns="" id="{42E2F0B4-0E86-473E-BC42-78D856A00C2E}"/>
+                <a16:creationId xmlns="" xmlns:a16="http://schemas.microsoft.com/office/drawing/2014/main" id="{42E2F0B4-0E86-473E-BC42-78D856A00C2E}"/>
               </a:ext>
             </a:extLst>
           </p:cNvPr>
@@ -1792,7 +1792,7 @@
           <p:cNvPr id="6" name="Footer Placeholder 5">
             <a:extLst>
               <a:ext uri="{FF2B5EF4-FFF2-40B4-BE49-F238E27FC236}">
-                <a16:creationId xmlns:a16="http://schemas.microsoft.com/office/drawing/2014/main" xmlns="" id="{782B9537-F43C-4042-B165-A00358F9E24F}"/>
+                <a16:creationId xmlns="" xmlns:a16="http://schemas.microsoft.com/office/drawing/2014/main" id="{782B9537-F43C-4042-B165-A00358F9E24F}"/>
               </a:ext>
             </a:extLst>
           </p:cNvPr>
@@ -1817,7 +1817,7 @@
           <p:cNvPr id="7" name="Slide Number Placeholder 6">
             <a:extLst>
               <a:ext uri="{FF2B5EF4-FFF2-40B4-BE49-F238E27FC236}">
-                <a16:creationId xmlns:a16="http://schemas.microsoft.com/office/drawing/2014/main" xmlns="" id="{FEF9F52F-61F2-4FEE-8989-2FB400190C4C}"/>
+                <a16:creationId xmlns="" xmlns:a16="http://schemas.microsoft.com/office/drawing/2014/main" id="{FEF9F52F-61F2-4FEE-8989-2FB400190C4C}"/>
               </a:ext>
             </a:extLst>
           </p:cNvPr>
@@ -1845,7 +1845,7 @@
     </p:spTree>
     <p:extLst>
       <p:ext uri="{BB962C8B-B14F-4D97-AF65-F5344CB8AC3E}">
-        <p14:creationId xmlns:p14="http://schemas.microsoft.com/office/powerpoint/2010/main" xmlns="" val="3361999117"/>
+        <p14:creationId xmlns="" xmlns:p14="http://schemas.microsoft.com/office/powerpoint/2010/main" val="3361999117"/>
       </p:ext>
     </p:extLst>
   </p:cSld>
@@ -1877,7 +1877,7 @@
           <p:cNvPr id="2" name="Title 1">
             <a:extLst>
               <a:ext uri="{FF2B5EF4-FFF2-40B4-BE49-F238E27FC236}">
-                <a16:creationId xmlns:a16="http://schemas.microsoft.com/office/drawing/2014/main" xmlns="" id="{66832E5C-0B2D-4DB5-95F6-3C2C825DFE54}"/>
+                <a16:creationId xmlns="" xmlns:a16="http://schemas.microsoft.com/office/drawing/2014/main" id="{66832E5C-0B2D-4DB5-95F6-3C2C825DFE54}"/>
               </a:ext>
             </a:extLst>
           </p:cNvPr>
@@ -1910,7 +1910,7 @@
           <p:cNvPr id="3" name="Text Placeholder 2">
             <a:extLst>
               <a:ext uri="{FF2B5EF4-FFF2-40B4-BE49-F238E27FC236}">
-                <a16:creationId xmlns:a16="http://schemas.microsoft.com/office/drawing/2014/main" xmlns="" id="{818F1C53-3F27-42E6-BE80-1DF57985741C}"/>
+                <a16:creationId xmlns="" xmlns:a16="http://schemas.microsoft.com/office/drawing/2014/main" id="{818F1C53-3F27-42E6-BE80-1DF57985741C}"/>
               </a:ext>
             </a:extLst>
           </p:cNvPr>
@@ -1983,7 +1983,7 @@
           <p:cNvPr id="4" name="Content Placeholder 3">
             <a:extLst>
               <a:ext uri="{FF2B5EF4-FFF2-40B4-BE49-F238E27FC236}">
-                <a16:creationId xmlns:a16="http://schemas.microsoft.com/office/drawing/2014/main" xmlns="" id="{938CC6CB-F028-4322-B54F-571203106F23}"/>
+                <a16:creationId xmlns="" xmlns:a16="http://schemas.microsoft.com/office/drawing/2014/main" id="{938CC6CB-F028-4322-B54F-571203106F23}"/>
               </a:ext>
             </a:extLst>
           </p:cNvPr>
@@ -2052,7 +2052,7 @@
           <p:cNvPr id="5" name="Text Placeholder 4">
             <a:extLst>
               <a:ext uri="{FF2B5EF4-FFF2-40B4-BE49-F238E27FC236}">
-                <a16:creationId xmlns:a16="http://schemas.microsoft.com/office/drawing/2014/main" xmlns="" id="{82AD2CD7-554E-4EAA-BAF6-86ABB7E81D25}"/>
+                <a16:creationId xmlns="" xmlns:a16="http://schemas.microsoft.com/office/drawing/2014/main" id="{82AD2CD7-554E-4EAA-BAF6-86ABB7E81D25}"/>
               </a:ext>
             </a:extLst>
           </p:cNvPr>
@@ -2125,7 +2125,7 @@
           <p:cNvPr id="6" name="Content Placeholder 5">
             <a:extLst>
               <a:ext uri="{FF2B5EF4-FFF2-40B4-BE49-F238E27FC236}">
-                <a16:creationId xmlns:a16="http://schemas.microsoft.com/office/drawing/2014/main" xmlns="" id="{1982A2D6-379C-4D26-90AC-9F2F46DCE7F3}"/>
+                <a16:creationId xmlns="" xmlns:a16="http://schemas.microsoft.com/office/drawing/2014/main" id="{1982A2D6-379C-4D26-90AC-9F2F46DCE7F3}"/>
               </a:ext>
             </a:extLst>
           </p:cNvPr>
@@ -2194,7 +2194,7 @@
           <p:cNvPr id="7" name="Date Placeholder 6">
             <a:extLst>
               <a:ext uri="{FF2B5EF4-FFF2-40B4-BE49-F238E27FC236}">
-                <a16:creationId xmlns:a16="http://schemas.microsoft.com/office/drawing/2014/main" xmlns="" id="{DEA0E4F3-8A65-4788-AE96-1FB2060F48D2}"/>
+                <a16:creationId xmlns="" xmlns:a16="http://schemas.microsoft.com/office/drawing/2014/main" id="{DEA0E4F3-8A65-4788-AE96-1FB2060F48D2}"/>
               </a:ext>
             </a:extLst>
           </p:cNvPr>
@@ -2224,7 +2224,7 @@
           <p:cNvPr id="8" name="Footer Placeholder 7">
             <a:extLst>
               <a:ext uri="{FF2B5EF4-FFF2-40B4-BE49-F238E27FC236}">
-                <a16:creationId xmlns:a16="http://schemas.microsoft.com/office/drawing/2014/main" xmlns="" id="{97522DA4-5EE1-440C-ADDE-D7B4F77B4E18}"/>
+                <a16:creationId xmlns="" xmlns:a16="http://schemas.microsoft.com/office/drawing/2014/main" id="{97522DA4-5EE1-440C-ADDE-D7B4F77B4E18}"/>
               </a:ext>
             </a:extLst>
           </p:cNvPr>
@@ -2249,7 +2249,7 @@
           <p:cNvPr id="9" name="Slide Number Placeholder 8">
             <a:extLst>
               <a:ext uri="{FF2B5EF4-FFF2-40B4-BE49-F238E27FC236}">
-                <a16:creationId xmlns:a16="http://schemas.microsoft.com/office/drawing/2014/main" xmlns="" id="{D6BC291E-B8EF-4ED7-A04A-23426C220CF0}"/>
+                <a16:creationId xmlns="" xmlns:a16="http://schemas.microsoft.com/office/drawing/2014/main" id="{D6BC291E-B8EF-4ED7-A04A-23426C220CF0}"/>
               </a:ext>
             </a:extLst>
           </p:cNvPr>
@@ -2277,7 +2277,7 @@
     </p:spTree>
     <p:extLst>
       <p:ext uri="{BB962C8B-B14F-4D97-AF65-F5344CB8AC3E}">
-        <p14:creationId xmlns:p14="http://schemas.microsoft.com/office/powerpoint/2010/main" xmlns="" val="266521033"/>
+        <p14:creationId xmlns="" xmlns:p14="http://schemas.microsoft.com/office/powerpoint/2010/main" val="266521033"/>
       </p:ext>
     </p:extLst>
   </p:cSld>
@@ -2309,7 +2309,7 @@
           <p:cNvPr id="2" name="Title 1">
             <a:extLst>
               <a:ext uri="{FF2B5EF4-FFF2-40B4-BE49-F238E27FC236}">
-                <a16:creationId xmlns:a16="http://schemas.microsoft.com/office/drawing/2014/main" xmlns="" id="{A01CB818-E8D0-497B-9A7E-4F281D0DBCCD}"/>
+                <a16:creationId xmlns="" xmlns:a16="http://schemas.microsoft.com/office/drawing/2014/main" id="{A01CB818-E8D0-497B-9A7E-4F281D0DBCCD}"/>
               </a:ext>
             </a:extLst>
           </p:cNvPr>
@@ -2337,7 +2337,7 @@
           <p:cNvPr id="3" name="Date Placeholder 2">
             <a:extLst>
               <a:ext uri="{FF2B5EF4-FFF2-40B4-BE49-F238E27FC236}">
-                <a16:creationId xmlns:a16="http://schemas.microsoft.com/office/drawing/2014/main" xmlns="" id="{CFE82B9D-CD58-4C05-8A78-CB6E0E9D49DC}"/>
+                <a16:creationId xmlns="" xmlns:a16="http://schemas.microsoft.com/office/drawing/2014/main" id="{CFE82B9D-CD58-4C05-8A78-CB6E0E9D49DC}"/>
               </a:ext>
             </a:extLst>
           </p:cNvPr>
@@ -2367,7 +2367,7 @@
           <p:cNvPr id="4" name="Footer Placeholder 3">
             <a:extLst>
               <a:ext uri="{FF2B5EF4-FFF2-40B4-BE49-F238E27FC236}">
-                <a16:creationId xmlns:a16="http://schemas.microsoft.com/office/drawing/2014/main" xmlns="" id="{BADE60CD-D6F3-40A7-BB8B-FEC8E3156AFB}"/>
+                <a16:creationId xmlns="" xmlns:a16="http://schemas.microsoft.com/office/drawing/2014/main" id="{BADE60CD-D6F3-40A7-BB8B-FEC8E3156AFB}"/>
               </a:ext>
             </a:extLst>
           </p:cNvPr>
@@ -2392,7 +2392,7 @@
           <p:cNvPr id="5" name="Slide Number Placeholder 4">
             <a:extLst>
               <a:ext uri="{FF2B5EF4-FFF2-40B4-BE49-F238E27FC236}">
-                <a16:creationId xmlns:a16="http://schemas.microsoft.com/office/drawing/2014/main" xmlns="" id="{7C02B832-C4FE-4F88-85EA-DDC16A82B9A9}"/>
+                <a16:creationId xmlns="" xmlns:a16="http://schemas.microsoft.com/office/drawing/2014/main" id="{7C02B832-C4FE-4F88-85EA-DDC16A82B9A9}"/>
               </a:ext>
             </a:extLst>
           </p:cNvPr>
@@ -2420,7 +2420,7 @@
     </p:spTree>
     <p:extLst>
       <p:ext uri="{BB962C8B-B14F-4D97-AF65-F5344CB8AC3E}">
-        <p14:creationId xmlns:p14="http://schemas.microsoft.com/office/powerpoint/2010/main" xmlns="" val="2655213164"/>
+        <p14:creationId xmlns="" xmlns:p14="http://schemas.microsoft.com/office/powerpoint/2010/main" val="2655213164"/>
       </p:ext>
     </p:extLst>
   </p:cSld>
@@ -2452,7 +2452,7 @@
           <p:cNvPr id="2" name="Date Placeholder 1">
             <a:extLst>
               <a:ext uri="{FF2B5EF4-FFF2-40B4-BE49-F238E27FC236}">
-                <a16:creationId xmlns:a16="http://schemas.microsoft.com/office/drawing/2014/main" xmlns="" id="{3C75B2FC-801A-44A4-96BF-26A9E8B2A1C6}"/>
+                <a16:creationId xmlns="" xmlns:a16="http://schemas.microsoft.com/office/drawing/2014/main" id="{3C75B2FC-801A-44A4-96BF-26A9E8B2A1C6}"/>
               </a:ext>
             </a:extLst>
           </p:cNvPr>
@@ -2482,7 +2482,7 @@
           <p:cNvPr id="3" name="Footer Placeholder 2">
             <a:extLst>
               <a:ext uri="{FF2B5EF4-FFF2-40B4-BE49-F238E27FC236}">
-                <a16:creationId xmlns:a16="http://schemas.microsoft.com/office/drawing/2014/main" xmlns="" id="{A8127F04-7E7E-485C-8B30-6B89E5A69F0A}"/>
+                <a16:creationId xmlns="" xmlns:a16="http://schemas.microsoft.com/office/drawing/2014/main" id="{A8127F04-7E7E-485C-8B30-6B89E5A69F0A}"/>
               </a:ext>
             </a:extLst>
           </p:cNvPr>
@@ -2507,7 +2507,7 @@
           <p:cNvPr id="4" name="Slide Number Placeholder 3">
             <a:extLst>
               <a:ext uri="{FF2B5EF4-FFF2-40B4-BE49-F238E27FC236}">
-                <a16:creationId xmlns:a16="http://schemas.microsoft.com/office/drawing/2014/main" xmlns="" id="{90933C81-AA74-4BCE-AA9E-56E5791D078C}"/>
+                <a16:creationId xmlns="" xmlns:a16="http://schemas.microsoft.com/office/drawing/2014/main" id="{90933C81-AA74-4BCE-AA9E-56E5791D078C}"/>
               </a:ext>
             </a:extLst>
           </p:cNvPr>
@@ -2535,7 +2535,7 @@
     </p:spTree>
     <p:extLst>
       <p:ext uri="{BB962C8B-B14F-4D97-AF65-F5344CB8AC3E}">
-        <p14:creationId xmlns:p14="http://schemas.microsoft.com/office/powerpoint/2010/main" xmlns="" val="576407341"/>
+        <p14:creationId xmlns="" xmlns:p14="http://schemas.microsoft.com/office/powerpoint/2010/main" val="576407341"/>
       </p:ext>
     </p:extLst>
   </p:cSld>
@@ -2567,7 +2567,7 @@
           <p:cNvPr id="2" name="Title 1">
             <a:extLst>
               <a:ext uri="{FF2B5EF4-FFF2-40B4-BE49-F238E27FC236}">
-                <a16:creationId xmlns:a16="http://schemas.microsoft.com/office/drawing/2014/main" xmlns="" id="{98DFD3CB-0541-46AD-B35E-0E0A1375E8A2}"/>
+                <a16:creationId xmlns="" xmlns:a16="http://schemas.microsoft.com/office/drawing/2014/main" id="{98DFD3CB-0541-46AD-B35E-0E0A1375E8A2}"/>
               </a:ext>
             </a:extLst>
           </p:cNvPr>
@@ -2604,7 +2604,7 @@
           <p:cNvPr id="3" name="Content Placeholder 2">
             <a:extLst>
               <a:ext uri="{FF2B5EF4-FFF2-40B4-BE49-F238E27FC236}">
-                <a16:creationId xmlns:a16="http://schemas.microsoft.com/office/drawing/2014/main" xmlns="" id="{EBF8EFDE-1D7D-46B8-AB55-A3C02EDD1888}"/>
+                <a16:creationId xmlns="" xmlns:a16="http://schemas.microsoft.com/office/drawing/2014/main" id="{EBF8EFDE-1D7D-46B8-AB55-A3C02EDD1888}"/>
               </a:ext>
             </a:extLst>
           </p:cNvPr>
@@ -2694,7 +2694,7 @@
           <p:cNvPr id="4" name="Text Placeholder 3">
             <a:extLst>
               <a:ext uri="{FF2B5EF4-FFF2-40B4-BE49-F238E27FC236}">
-                <a16:creationId xmlns:a16="http://schemas.microsoft.com/office/drawing/2014/main" xmlns="" id="{6411D2F5-DB36-4943-8A14-96AFC4883065}"/>
+                <a16:creationId xmlns="" xmlns:a16="http://schemas.microsoft.com/office/drawing/2014/main" id="{6411D2F5-DB36-4943-8A14-96AFC4883065}"/>
               </a:ext>
             </a:extLst>
           </p:cNvPr>
@@ -2765,7 +2765,7 @@
           <p:cNvPr id="5" name="Date Placeholder 4">
             <a:extLst>
               <a:ext uri="{FF2B5EF4-FFF2-40B4-BE49-F238E27FC236}">
-                <a16:creationId xmlns:a16="http://schemas.microsoft.com/office/drawing/2014/main" xmlns="" id="{106C07D4-6597-444C-9EFD-62021AE7618C}"/>
+                <a16:creationId xmlns="" xmlns:a16="http://schemas.microsoft.com/office/drawing/2014/main" id="{106C07D4-6597-444C-9EFD-62021AE7618C}"/>
               </a:ext>
             </a:extLst>
           </p:cNvPr>
@@ -2795,7 +2795,7 @@
           <p:cNvPr id="6" name="Footer Placeholder 5">
             <a:extLst>
               <a:ext uri="{FF2B5EF4-FFF2-40B4-BE49-F238E27FC236}">
-                <a16:creationId xmlns:a16="http://schemas.microsoft.com/office/drawing/2014/main" xmlns="" id="{712D0D2C-70E8-4A24-9727-BEAF10B17D6C}"/>
+                <a16:creationId xmlns="" xmlns:a16="http://schemas.microsoft.com/office/drawing/2014/main" id="{712D0D2C-70E8-4A24-9727-BEAF10B17D6C}"/>
               </a:ext>
             </a:extLst>
           </p:cNvPr>
@@ -2820,7 +2820,7 @@
           <p:cNvPr id="7" name="Slide Number Placeholder 6">
             <a:extLst>
               <a:ext uri="{FF2B5EF4-FFF2-40B4-BE49-F238E27FC236}">
-                <a16:creationId xmlns:a16="http://schemas.microsoft.com/office/drawing/2014/main" xmlns="" id="{F0D9E0F6-7216-48A1-8BCA-770C6DE3875B}"/>
+                <a16:creationId xmlns="" xmlns:a16="http://schemas.microsoft.com/office/drawing/2014/main" id="{F0D9E0F6-7216-48A1-8BCA-770C6DE3875B}"/>
               </a:ext>
             </a:extLst>
           </p:cNvPr>
@@ -2848,7 +2848,7 @@
     </p:spTree>
     <p:extLst>
       <p:ext uri="{BB962C8B-B14F-4D97-AF65-F5344CB8AC3E}">
-        <p14:creationId xmlns:p14="http://schemas.microsoft.com/office/powerpoint/2010/main" xmlns="" val="780026818"/>
+        <p14:creationId xmlns="" xmlns:p14="http://schemas.microsoft.com/office/powerpoint/2010/main" val="780026818"/>
       </p:ext>
     </p:extLst>
   </p:cSld>
@@ -2880,7 +2880,7 @@
           <p:cNvPr id="2" name="Title 1">
             <a:extLst>
               <a:ext uri="{FF2B5EF4-FFF2-40B4-BE49-F238E27FC236}">
-                <a16:creationId xmlns:a16="http://schemas.microsoft.com/office/drawing/2014/main" xmlns="" id="{1E4CBEBD-5F1A-4111-A7F2-1CE82C9A69D8}"/>
+                <a16:creationId xmlns="" xmlns:a16="http://schemas.microsoft.com/office/drawing/2014/main" id="{1E4CBEBD-5F1A-4111-A7F2-1CE82C9A69D8}"/>
               </a:ext>
             </a:extLst>
           </p:cNvPr>
@@ -2917,7 +2917,7 @@
           <p:cNvPr id="3" name="Picture Placeholder 2">
             <a:extLst>
               <a:ext uri="{FF2B5EF4-FFF2-40B4-BE49-F238E27FC236}">
-                <a16:creationId xmlns:a16="http://schemas.microsoft.com/office/drawing/2014/main" xmlns="" id="{C00517FB-4008-4F68-B193-482971BA720D}"/>
+                <a16:creationId xmlns="" xmlns:a16="http://schemas.microsoft.com/office/drawing/2014/main" id="{C00517FB-4008-4F68-B193-482971BA720D}"/>
               </a:ext>
             </a:extLst>
           </p:cNvPr>
@@ -2984,7 +2984,7 @@
           <p:cNvPr id="4" name="Text Placeholder 3">
             <a:extLst>
               <a:ext uri="{FF2B5EF4-FFF2-40B4-BE49-F238E27FC236}">
-                <a16:creationId xmlns:a16="http://schemas.microsoft.com/office/drawing/2014/main" xmlns="" id="{92606C5F-0885-458F-9B21-47E60171BF0E}"/>
+                <a16:creationId xmlns="" xmlns:a16="http://schemas.microsoft.com/office/drawing/2014/main" id="{92606C5F-0885-458F-9B21-47E60171BF0E}"/>
               </a:ext>
             </a:extLst>
           </p:cNvPr>
@@ -3055,7 +3055,7 @@
           <p:cNvPr id="5" name="Date Placeholder 4">
             <a:extLst>
               <a:ext uri="{FF2B5EF4-FFF2-40B4-BE49-F238E27FC236}">
-                <a16:creationId xmlns:a16="http://schemas.microsoft.com/office/drawing/2014/main" xmlns="" id="{04886F2E-B752-4D78-8DC4-C96A1A00E670}"/>
+                <a16:creationId xmlns="" xmlns:a16="http://schemas.microsoft.com/office/drawing/2014/main" id="{04886F2E-B752-4D78-8DC4-C96A1A00E670}"/>
               </a:ext>
             </a:extLst>
           </p:cNvPr>
@@ -3085,7 +3085,7 @@
           <p:cNvPr id="6" name="Footer Placeholder 5">
             <a:extLst>
               <a:ext uri="{FF2B5EF4-FFF2-40B4-BE49-F238E27FC236}">
-                <a16:creationId xmlns:a16="http://schemas.microsoft.com/office/drawing/2014/main" xmlns="" id="{4FC37751-8BB8-4224-870A-A2953E76073F}"/>
+                <a16:creationId xmlns="" xmlns:a16="http://schemas.microsoft.com/office/drawing/2014/main" id="{4FC37751-8BB8-4224-870A-A2953E76073F}"/>
               </a:ext>
             </a:extLst>
           </p:cNvPr>
@@ -3110,7 +3110,7 @@
           <p:cNvPr id="7" name="Slide Number Placeholder 6">
             <a:extLst>
               <a:ext uri="{FF2B5EF4-FFF2-40B4-BE49-F238E27FC236}">
-                <a16:creationId xmlns:a16="http://schemas.microsoft.com/office/drawing/2014/main" xmlns="" id="{6242CE94-BD7E-44B3-9B5E-67D4BD317E99}"/>
+                <a16:creationId xmlns="" xmlns:a16="http://schemas.microsoft.com/office/drawing/2014/main" id="{6242CE94-BD7E-44B3-9B5E-67D4BD317E99}"/>
               </a:ext>
             </a:extLst>
           </p:cNvPr>
@@ -3138,7 +3138,7 @@
     </p:spTree>
     <p:extLst>
       <p:ext uri="{BB962C8B-B14F-4D97-AF65-F5344CB8AC3E}">
-        <p14:creationId xmlns:p14="http://schemas.microsoft.com/office/powerpoint/2010/main" xmlns="" val="1894485911"/>
+        <p14:creationId xmlns="" xmlns:p14="http://schemas.microsoft.com/office/powerpoint/2010/main" val="1894485911"/>
       </p:ext>
     </p:extLst>
   </p:cSld>
@@ -3175,7 +3175,7 @@
           <p:cNvPr id="7" name="Group 6">
             <a:extLst>
               <a:ext uri="{FF2B5EF4-FFF2-40B4-BE49-F238E27FC236}">
-                <a16:creationId xmlns:a16="http://schemas.microsoft.com/office/drawing/2014/main" xmlns="" id="{71AFD227-869A-489C-A9B5-3F0498DF3C0C}"/>
+                <a16:creationId xmlns="" xmlns:a16="http://schemas.microsoft.com/office/drawing/2014/main" id="{71AFD227-869A-489C-A9B5-3F0498DF3C0C}"/>
               </a:ext>
             </a:extLst>
           </p:cNvPr>
@@ -3200,7 +3200,7 @@
             <p:cNvPr id="8" name="Freeform 8">
               <a:extLst>
                 <a:ext uri="{FF2B5EF4-FFF2-40B4-BE49-F238E27FC236}">
-                  <a16:creationId xmlns:a16="http://schemas.microsoft.com/office/drawing/2014/main" xmlns="" id="{62704B34-199B-4964-9C78-3AB9735915AA}"/>
+                  <a16:creationId xmlns="" xmlns:a16="http://schemas.microsoft.com/office/drawing/2014/main" id="{62704B34-199B-4964-9C78-3AB9735915AA}"/>
                 </a:ext>
               </a:extLst>
             </p:cNvPr>
@@ -3282,7 +3282,7 @@
             <p:cNvPr id="9" name="Freeform 10">
               <a:extLst>
                 <a:ext uri="{FF2B5EF4-FFF2-40B4-BE49-F238E27FC236}">
-                  <a16:creationId xmlns:a16="http://schemas.microsoft.com/office/drawing/2014/main" xmlns="" id="{8B1E8DB8-017D-454E-849F-EE5742849FD4}"/>
+                  <a16:creationId xmlns="" xmlns:a16="http://schemas.microsoft.com/office/drawing/2014/main" id="{8B1E8DB8-017D-454E-849F-EE5742849FD4}"/>
                 </a:ext>
               </a:extLst>
             </p:cNvPr>
@@ -3364,7 +3364,7 @@
             <p:cNvPr id="10" name="Freeform 15">
               <a:extLst>
                 <a:ext uri="{FF2B5EF4-FFF2-40B4-BE49-F238E27FC236}">
-                  <a16:creationId xmlns:a16="http://schemas.microsoft.com/office/drawing/2014/main" xmlns="" id="{16D80E5D-5099-41C4-A80A-1B1538C382FC}"/>
+                  <a16:creationId xmlns="" xmlns:a16="http://schemas.microsoft.com/office/drawing/2014/main" id="{16D80E5D-5099-41C4-A80A-1B1538C382FC}"/>
                 </a:ext>
               </a:extLst>
             </p:cNvPr>
@@ -3446,7 +3446,7 @@
             <p:cNvPr id="11" name="Freeform 18">
               <a:extLst>
                 <a:ext uri="{FF2B5EF4-FFF2-40B4-BE49-F238E27FC236}">
-                  <a16:creationId xmlns:a16="http://schemas.microsoft.com/office/drawing/2014/main" xmlns="" id="{947751E1-E2F4-467E-B547-3BD4BAB7F560}"/>
+                  <a16:creationId xmlns="" xmlns:a16="http://schemas.microsoft.com/office/drawing/2014/main" id="{947751E1-E2F4-467E-B547-3BD4BAB7F560}"/>
                 </a:ext>
               </a:extLst>
             </p:cNvPr>
@@ -3528,7 +3528,7 @@
             <p:cNvPr id="12" name="Freeform 19">
               <a:extLst>
                 <a:ext uri="{FF2B5EF4-FFF2-40B4-BE49-F238E27FC236}">
-                  <a16:creationId xmlns:a16="http://schemas.microsoft.com/office/drawing/2014/main" xmlns="" id="{55D8869B-B701-4268-9856-876345C8AE3F}"/>
+                  <a16:creationId xmlns="" xmlns:a16="http://schemas.microsoft.com/office/drawing/2014/main" id="{55D8869B-B701-4268-9856-876345C8AE3F}"/>
                 </a:ext>
               </a:extLst>
             </p:cNvPr>
@@ -3610,7 +3610,7 @@
             <p:cNvPr id="13" name="Freeform 20">
               <a:extLst>
                 <a:ext uri="{FF2B5EF4-FFF2-40B4-BE49-F238E27FC236}">
-                  <a16:creationId xmlns:a16="http://schemas.microsoft.com/office/drawing/2014/main" xmlns="" id="{A25CA59C-849F-4CE4-A9B0-293F98DE2C7C}"/>
+                  <a16:creationId xmlns="" xmlns:a16="http://schemas.microsoft.com/office/drawing/2014/main" id="{A25CA59C-849F-4CE4-A9B0-293F98DE2C7C}"/>
                 </a:ext>
               </a:extLst>
             </p:cNvPr>
@@ -3692,7 +3692,7 @@
             <p:cNvPr id="14" name="Freeform 22">
               <a:extLst>
                 <a:ext uri="{FF2B5EF4-FFF2-40B4-BE49-F238E27FC236}">
-                  <a16:creationId xmlns:a16="http://schemas.microsoft.com/office/drawing/2014/main" xmlns="" id="{FE000DB1-AAA1-4BFF-8F14-53624C2F9E0B}"/>
+                  <a16:creationId xmlns="" xmlns:a16="http://schemas.microsoft.com/office/drawing/2014/main" id="{FE000DB1-AAA1-4BFF-8F14-53624C2F9E0B}"/>
                 </a:ext>
               </a:extLst>
             </p:cNvPr>
@@ -3774,7 +3774,7 @@
             <p:cNvPr id="15" name="Freeform 23">
               <a:extLst>
                 <a:ext uri="{FF2B5EF4-FFF2-40B4-BE49-F238E27FC236}">
-                  <a16:creationId xmlns:a16="http://schemas.microsoft.com/office/drawing/2014/main" xmlns="" id="{5EEFBC14-7E5B-47B2-B5E3-E90991F89191}"/>
+                  <a16:creationId xmlns="" xmlns:a16="http://schemas.microsoft.com/office/drawing/2014/main" id="{5EEFBC14-7E5B-47B2-B5E3-E90991F89191}"/>
                 </a:ext>
               </a:extLst>
             </p:cNvPr>
@@ -3856,7 +3856,7 @@
             <p:cNvPr id="16" name="Freeform 26">
               <a:extLst>
                 <a:ext uri="{FF2B5EF4-FFF2-40B4-BE49-F238E27FC236}">
-                  <a16:creationId xmlns:a16="http://schemas.microsoft.com/office/drawing/2014/main" xmlns="" id="{00AFF6E4-A34A-4FD3-8C57-BB96114822D1}"/>
+                  <a16:creationId xmlns="" xmlns:a16="http://schemas.microsoft.com/office/drawing/2014/main" id="{00AFF6E4-A34A-4FD3-8C57-BB96114822D1}"/>
                 </a:ext>
               </a:extLst>
             </p:cNvPr>
@@ -3938,7 +3938,7 @@
             <p:cNvPr id="17" name="Freeform 27">
               <a:extLst>
                 <a:ext uri="{FF2B5EF4-FFF2-40B4-BE49-F238E27FC236}">
-                  <a16:creationId xmlns:a16="http://schemas.microsoft.com/office/drawing/2014/main" xmlns="" id="{C63A8474-C075-4441-A0B3-52286EA50093}"/>
+                  <a16:creationId xmlns="" xmlns:a16="http://schemas.microsoft.com/office/drawing/2014/main" id="{C63A8474-C075-4441-A0B3-52286EA50093}"/>
                 </a:ext>
               </a:extLst>
             </p:cNvPr>
@@ -4020,7 +4020,7 @@
             <p:cNvPr id="18" name="Freeform 28">
               <a:extLst>
                 <a:ext uri="{FF2B5EF4-FFF2-40B4-BE49-F238E27FC236}">
-                  <a16:creationId xmlns:a16="http://schemas.microsoft.com/office/drawing/2014/main" xmlns="" id="{35DA4698-A2ED-4512-8887-F12D3F14372A}"/>
+                  <a16:creationId xmlns="" xmlns:a16="http://schemas.microsoft.com/office/drawing/2014/main" id="{35DA4698-A2ED-4512-8887-F12D3F14372A}"/>
                 </a:ext>
               </a:extLst>
             </p:cNvPr>
@@ -4102,7 +4102,7 @@
             <p:cNvPr id="19" name="Freeform 30">
               <a:extLst>
                 <a:ext uri="{FF2B5EF4-FFF2-40B4-BE49-F238E27FC236}">
-                  <a16:creationId xmlns:a16="http://schemas.microsoft.com/office/drawing/2014/main" xmlns="" id="{3358E118-D590-4E50-B21C-6CDAA1CCAFCB}"/>
+                  <a16:creationId xmlns="" xmlns:a16="http://schemas.microsoft.com/office/drawing/2014/main" id="{3358E118-D590-4E50-B21C-6CDAA1CCAFCB}"/>
                 </a:ext>
               </a:extLst>
             </p:cNvPr>
@@ -4184,7 +4184,7 @@
             <p:cNvPr id="20" name="Freeform 43">
               <a:extLst>
                 <a:ext uri="{FF2B5EF4-FFF2-40B4-BE49-F238E27FC236}">
-                  <a16:creationId xmlns:a16="http://schemas.microsoft.com/office/drawing/2014/main" xmlns="" id="{F1EE889E-60FF-423F-ADCB-6CBEE853A040}"/>
+                  <a16:creationId xmlns="" xmlns:a16="http://schemas.microsoft.com/office/drawing/2014/main" id="{F1EE889E-60FF-423F-ADCB-6CBEE853A040}"/>
                 </a:ext>
               </a:extLst>
             </p:cNvPr>
@@ -4266,7 +4266,7 @@
             <p:cNvPr id="21" name="Freeform 51">
               <a:extLst>
                 <a:ext uri="{FF2B5EF4-FFF2-40B4-BE49-F238E27FC236}">
-                  <a16:creationId xmlns:a16="http://schemas.microsoft.com/office/drawing/2014/main" xmlns="" id="{A4AA0634-0A7C-4A35-8EB7-775200F129FD}"/>
+                  <a16:creationId xmlns="" xmlns:a16="http://schemas.microsoft.com/office/drawing/2014/main" id="{A4AA0634-0A7C-4A35-8EB7-775200F129FD}"/>
                 </a:ext>
               </a:extLst>
             </p:cNvPr>
@@ -4358,7 +4358,7 @@
             <p:cNvPr id="22" name="Freeform 52">
               <a:extLst>
                 <a:ext uri="{FF2B5EF4-FFF2-40B4-BE49-F238E27FC236}">
-                  <a16:creationId xmlns:a16="http://schemas.microsoft.com/office/drawing/2014/main" xmlns="" id="{EBA21558-CAC3-445C-8882-5D4A0C6D2A0E}"/>
+                  <a16:creationId xmlns="" xmlns:a16="http://schemas.microsoft.com/office/drawing/2014/main" id="{EBA21558-CAC3-445C-8882-5D4A0C6D2A0E}"/>
                 </a:ext>
               </a:extLst>
             </p:cNvPr>
@@ -4440,7 +4440,7 @@
             <p:cNvPr id="23" name="Freeform 53">
               <a:extLst>
                 <a:ext uri="{FF2B5EF4-FFF2-40B4-BE49-F238E27FC236}">
-                  <a16:creationId xmlns:a16="http://schemas.microsoft.com/office/drawing/2014/main" xmlns="" id="{2E9415F1-5D31-4C25-9E26-203EEF500877}"/>
+                  <a16:creationId xmlns="" xmlns:a16="http://schemas.microsoft.com/office/drawing/2014/main" id="{2E9415F1-5D31-4C25-9E26-203EEF500877}"/>
                 </a:ext>
               </a:extLst>
             </p:cNvPr>
@@ -4522,7 +4522,7 @@
             <p:cNvPr id="24" name="Freeform 54">
               <a:extLst>
                 <a:ext uri="{FF2B5EF4-FFF2-40B4-BE49-F238E27FC236}">
-                  <a16:creationId xmlns:a16="http://schemas.microsoft.com/office/drawing/2014/main" xmlns="" id="{622FC1F6-879A-45BA-8752-08020C39CE29}"/>
+                  <a16:creationId xmlns="" xmlns:a16="http://schemas.microsoft.com/office/drawing/2014/main" id="{622FC1F6-879A-45BA-8752-08020C39CE29}"/>
                 </a:ext>
               </a:extLst>
             </p:cNvPr>
@@ -4604,7 +4604,7 @@
             <p:cNvPr id="25" name="Freeform 55">
               <a:extLst>
                 <a:ext uri="{FF2B5EF4-FFF2-40B4-BE49-F238E27FC236}">
-                  <a16:creationId xmlns:a16="http://schemas.microsoft.com/office/drawing/2014/main" xmlns="" id="{BA09826C-58E2-48C5-9666-333326C2CA44}"/>
+                  <a16:creationId xmlns="" xmlns:a16="http://schemas.microsoft.com/office/drawing/2014/main" id="{BA09826C-58E2-48C5-9666-333326C2CA44}"/>
                 </a:ext>
               </a:extLst>
             </p:cNvPr>
@@ -4686,7 +4686,7 @@
             <p:cNvPr id="26" name="Freeform 56">
               <a:extLst>
                 <a:ext uri="{FF2B5EF4-FFF2-40B4-BE49-F238E27FC236}">
-                  <a16:creationId xmlns:a16="http://schemas.microsoft.com/office/drawing/2014/main" xmlns="" id="{A6D3555F-4EA1-4EA7-9D08-2D75CE51927B}"/>
+                  <a16:creationId xmlns="" xmlns:a16="http://schemas.microsoft.com/office/drawing/2014/main" id="{A6D3555F-4EA1-4EA7-9D08-2D75CE51927B}"/>
                 </a:ext>
               </a:extLst>
             </p:cNvPr>
@@ -4768,7 +4768,7 @@
             <p:cNvPr id="27" name="Freeform 57">
               <a:extLst>
                 <a:ext uri="{FF2B5EF4-FFF2-40B4-BE49-F238E27FC236}">
-                  <a16:creationId xmlns:a16="http://schemas.microsoft.com/office/drawing/2014/main" xmlns="" id="{60FA20E8-EDAA-4310-B870-97807901AC18}"/>
+                  <a16:creationId xmlns="" xmlns:a16="http://schemas.microsoft.com/office/drawing/2014/main" id="{60FA20E8-EDAA-4310-B870-97807901AC18}"/>
                 </a:ext>
               </a:extLst>
             </p:cNvPr>
@@ -4850,7 +4850,7 @@
             <p:cNvPr id="28" name="Freeform 59">
               <a:extLst>
                 <a:ext uri="{FF2B5EF4-FFF2-40B4-BE49-F238E27FC236}">
-                  <a16:creationId xmlns:a16="http://schemas.microsoft.com/office/drawing/2014/main" xmlns="" id="{F5552AA2-C2AB-4D59-B6EF-E8E5EE110E52}"/>
+                  <a16:creationId xmlns="" xmlns:a16="http://schemas.microsoft.com/office/drawing/2014/main" id="{F5552AA2-C2AB-4D59-B6EF-E8E5EE110E52}"/>
                 </a:ext>
               </a:extLst>
             </p:cNvPr>
@@ -4932,7 +4932,7 @@
             <p:cNvPr id="29" name="Freeform 60">
               <a:extLst>
                 <a:ext uri="{FF2B5EF4-FFF2-40B4-BE49-F238E27FC236}">
-                  <a16:creationId xmlns:a16="http://schemas.microsoft.com/office/drawing/2014/main" xmlns="" id="{0BA267D0-8F6B-4803-B948-70E29B4587EB}"/>
+                  <a16:creationId xmlns="" xmlns:a16="http://schemas.microsoft.com/office/drawing/2014/main" id="{0BA267D0-8F6B-4803-B948-70E29B4587EB}"/>
                 </a:ext>
               </a:extLst>
             </p:cNvPr>
@@ -5014,7 +5014,7 @@
             <p:cNvPr id="30" name="Freeform 61">
               <a:extLst>
                 <a:ext uri="{FF2B5EF4-FFF2-40B4-BE49-F238E27FC236}">
-                  <a16:creationId xmlns:a16="http://schemas.microsoft.com/office/drawing/2014/main" xmlns="" id="{86E372A3-B9F4-4FEE-8B96-D9AD879E214E}"/>
+                  <a16:creationId xmlns="" xmlns:a16="http://schemas.microsoft.com/office/drawing/2014/main" id="{86E372A3-B9F4-4FEE-8B96-D9AD879E214E}"/>
                 </a:ext>
               </a:extLst>
             </p:cNvPr>
@@ -5096,7 +5096,7 @@
             <p:cNvPr id="31" name="Freeform 5">
               <a:extLst>
                 <a:ext uri="{FF2B5EF4-FFF2-40B4-BE49-F238E27FC236}">
-                  <a16:creationId xmlns:a16="http://schemas.microsoft.com/office/drawing/2014/main" xmlns="" id="{FF0C4564-5DA6-4224-A8B7-85CE1323DE8F}"/>
+                  <a16:creationId xmlns="" xmlns:a16="http://schemas.microsoft.com/office/drawing/2014/main" id="{FF0C4564-5DA6-4224-A8B7-85CE1323DE8F}"/>
                 </a:ext>
               </a:extLst>
             </p:cNvPr>
@@ -5178,7 +5178,7 @@
             <p:cNvPr id="32" name="Freeform 6">
               <a:extLst>
                 <a:ext uri="{FF2B5EF4-FFF2-40B4-BE49-F238E27FC236}">
-                  <a16:creationId xmlns:a16="http://schemas.microsoft.com/office/drawing/2014/main" xmlns="" id="{19F31D0D-C43D-4BB0-A13C-9524B84117D4}"/>
+                  <a16:creationId xmlns="" xmlns:a16="http://schemas.microsoft.com/office/drawing/2014/main" id="{19F31D0D-C43D-4BB0-A13C-9524B84117D4}"/>
                 </a:ext>
               </a:extLst>
             </p:cNvPr>
@@ -5260,7 +5260,7 @@
             <p:cNvPr id="33" name="Freeform 7">
               <a:extLst>
                 <a:ext uri="{FF2B5EF4-FFF2-40B4-BE49-F238E27FC236}">
-                  <a16:creationId xmlns:a16="http://schemas.microsoft.com/office/drawing/2014/main" xmlns="" id="{6B32FB03-B0FE-4731-BE41-C59AFB49FBF5}"/>
+                  <a16:creationId xmlns="" xmlns:a16="http://schemas.microsoft.com/office/drawing/2014/main" id="{6B32FB03-B0FE-4731-BE41-C59AFB49FBF5}"/>
                 </a:ext>
               </a:extLst>
             </p:cNvPr>
@@ -5342,7 +5342,7 @@
             <p:cNvPr id="34" name="Freeform 8">
               <a:extLst>
                 <a:ext uri="{FF2B5EF4-FFF2-40B4-BE49-F238E27FC236}">
-                  <a16:creationId xmlns:a16="http://schemas.microsoft.com/office/drawing/2014/main" xmlns="" id="{BDD5B6F0-1E17-4DCD-AE5F-ED8C48892FEF}"/>
+                  <a16:creationId xmlns="" xmlns:a16="http://schemas.microsoft.com/office/drawing/2014/main" id="{BDD5B6F0-1E17-4DCD-AE5F-ED8C48892FEF}"/>
                 </a:ext>
               </a:extLst>
             </p:cNvPr>
@@ -5424,7 +5424,7 @@
             <p:cNvPr id="35" name="Freeform 9">
               <a:extLst>
                 <a:ext uri="{FF2B5EF4-FFF2-40B4-BE49-F238E27FC236}">
-                  <a16:creationId xmlns:a16="http://schemas.microsoft.com/office/drawing/2014/main" xmlns="" id="{0290BE17-E89B-4AF9-B3F6-AF4884D52467}"/>
+                  <a16:creationId xmlns="" xmlns:a16="http://schemas.microsoft.com/office/drawing/2014/main" id="{0290BE17-E89B-4AF9-B3F6-AF4884D52467}"/>
                 </a:ext>
               </a:extLst>
             </p:cNvPr>
@@ -5506,7 +5506,7 @@
             <p:cNvPr id="36" name="Freeform 11">
               <a:extLst>
                 <a:ext uri="{FF2B5EF4-FFF2-40B4-BE49-F238E27FC236}">
-                  <a16:creationId xmlns:a16="http://schemas.microsoft.com/office/drawing/2014/main" xmlns="" id="{85F63089-F77F-4F02-8417-AAC1847FBCA7}"/>
+                  <a16:creationId xmlns="" xmlns:a16="http://schemas.microsoft.com/office/drawing/2014/main" id="{85F63089-F77F-4F02-8417-AAC1847FBCA7}"/>
                 </a:ext>
               </a:extLst>
             </p:cNvPr>
@@ -5588,7 +5588,7 @@
             <p:cNvPr id="37" name="Freeform 12">
               <a:extLst>
                 <a:ext uri="{FF2B5EF4-FFF2-40B4-BE49-F238E27FC236}">
-                  <a16:creationId xmlns:a16="http://schemas.microsoft.com/office/drawing/2014/main" xmlns="" id="{7B01CD5E-570F-4CBF-9904-94F30D928C54}"/>
+                  <a16:creationId xmlns="" xmlns:a16="http://schemas.microsoft.com/office/drawing/2014/main" id="{7B01CD5E-570F-4CBF-9904-94F30D928C54}"/>
                 </a:ext>
               </a:extLst>
             </p:cNvPr>
@@ -5670,7 +5670,7 @@
             <p:cNvPr id="38" name="Freeform 13">
               <a:extLst>
                 <a:ext uri="{FF2B5EF4-FFF2-40B4-BE49-F238E27FC236}">
-                  <a16:creationId xmlns:a16="http://schemas.microsoft.com/office/drawing/2014/main" xmlns="" id="{7EE6A672-2915-4B03-99A9-9364D5F1521E}"/>
+                  <a16:creationId xmlns="" xmlns:a16="http://schemas.microsoft.com/office/drawing/2014/main" id="{7EE6A672-2915-4B03-99A9-9364D5F1521E}"/>
                 </a:ext>
               </a:extLst>
             </p:cNvPr>
@@ -5752,7 +5752,7 @@
             <p:cNvPr id="39" name="Freeform 14">
               <a:extLst>
                 <a:ext uri="{FF2B5EF4-FFF2-40B4-BE49-F238E27FC236}">
-                  <a16:creationId xmlns:a16="http://schemas.microsoft.com/office/drawing/2014/main" xmlns="" id="{2136B643-14E1-443A-BC1C-06ADAE65C30F}"/>
+                  <a16:creationId xmlns="" xmlns:a16="http://schemas.microsoft.com/office/drawing/2014/main" id="{2136B643-14E1-443A-BC1C-06ADAE65C30F}"/>
                 </a:ext>
               </a:extLst>
             </p:cNvPr>
@@ -5834,7 +5834,7 @@
             <p:cNvPr id="40" name="Freeform 16">
               <a:extLst>
                 <a:ext uri="{FF2B5EF4-FFF2-40B4-BE49-F238E27FC236}">
-                  <a16:creationId xmlns:a16="http://schemas.microsoft.com/office/drawing/2014/main" xmlns="" id="{867FA393-4F37-4E1A-870B-F96775FAB7E8}"/>
+                  <a16:creationId xmlns="" xmlns:a16="http://schemas.microsoft.com/office/drawing/2014/main" id="{867FA393-4F37-4E1A-870B-F96775FAB7E8}"/>
                 </a:ext>
               </a:extLst>
             </p:cNvPr>
@@ -5916,7 +5916,7 @@
             <p:cNvPr id="41" name="Freeform 17">
               <a:extLst>
                 <a:ext uri="{FF2B5EF4-FFF2-40B4-BE49-F238E27FC236}">
-                  <a16:creationId xmlns:a16="http://schemas.microsoft.com/office/drawing/2014/main" xmlns="" id="{E225A1BE-FAD2-4764-A7E4-A6DA07D0573B}"/>
+                  <a16:creationId xmlns="" xmlns:a16="http://schemas.microsoft.com/office/drawing/2014/main" id="{E225A1BE-FAD2-4764-A7E4-A6DA07D0573B}"/>
                 </a:ext>
               </a:extLst>
             </p:cNvPr>
@@ -5998,7 +5998,7 @@
             <p:cNvPr id="42" name="Freeform 21">
               <a:extLst>
                 <a:ext uri="{FF2B5EF4-FFF2-40B4-BE49-F238E27FC236}">
-                  <a16:creationId xmlns:a16="http://schemas.microsoft.com/office/drawing/2014/main" xmlns="" id="{25D65388-C7E0-4C07-822A-03C5009C6D1E}"/>
+                  <a16:creationId xmlns="" xmlns:a16="http://schemas.microsoft.com/office/drawing/2014/main" id="{25D65388-C7E0-4C07-822A-03C5009C6D1E}"/>
                 </a:ext>
               </a:extLst>
             </p:cNvPr>
@@ -6080,7 +6080,7 @@
             <p:cNvPr id="43" name="Freeform 25">
               <a:extLst>
                 <a:ext uri="{FF2B5EF4-FFF2-40B4-BE49-F238E27FC236}">
-                  <a16:creationId xmlns:a16="http://schemas.microsoft.com/office/drawing/2014/main" xmlns="" id="{E1D79822-C494-449C-B439-F437DAD4F218}"/>
+                  <a16:creationId xmlns="" xmlns:a16="http://schemas.microsoft.com/office/drawing/2014/main" id="{E1D79822-C494-449C-B439-F437DAD4F218}"/>
                 </a:ext>
               </a:extLst>
             </p:cNvPr>
@@ -6162,7 +6162,7 @@
             <p:cNvPr id="44" name="Freeform 29">
               <a:extLst>
                 <a:ext uri="{FF2B5EF4-FFF2-40B4-BE49-F238E27FC236}">
-                  <a16:creationId xmlns:a16="http://schemas.microsoft.com/office/drawing/2014/main" xmlns="" id="{CDB324E5-E8D9-40E3-BAB4-1F87E67E4F46}"/>
+                  <a16:creationId xmlns="" xmlns:a16="http://schemas.microsoft.com/office/drawing/2014/main" id="{CDB324E5-E8D9-40E3-BAB4-1F87E67E4F46}"/>
                 </a:ext>
               </a:extLst>
             </p:cNvPr>
@@ -6244,7 +6244,7 @@
             <p:cNvPr id="45" name="Freeform 31">
               <a:extLst>
                 <a:ext uri="{FF2B5EF4-FFF2-40B4-BE49-F238E27FC236}">
-                  <a16:creationId xmlns:a16="http://schemas.microsoft.com/office/drawing/2014/main" xmlns="" id="{15404AB3-12EB-462E-85A2-AF4A7E91D729}"/>
+                  <a16:creationId xmlns="" xmlns:a16="http://schemas.microsoft.com/office/drawing/2014/main" id="{15404AB3-12EB-462E-85A2-AF4A7E91D729}"/>
                 </a:ext>
               </a:extLst>
             </p:cNvPr>
@@ -6326,7 +6326,7 @@
             <p:cNvPr id="46" name="Freeform 32">
               <a:extLst>
                 <a:ext uri="{FF2B5EF4-FFF2-40B4-BE49-F238E27FC236}">
-                  <a16:creationId xmlns:a16="http://schemas.microsoft.com/office/drawing/2014/main" xmlns="" id="{228021CB-53B3-4BCC-A14C-0B6951FC971F}"/>
+                  <a16:creationId xmlns="" xmlns:a16="http://schemas.microsoft.com/office/drawing/2014/main" id="{228021CB-53B3-4BCC-A14C-0B6951FC971F}"/>
                 </a:ext>
               </a:extLst>
             </p:cNvPr>
@@ -6408,7 +6408,7 @@
             <p:cNvPr id="47" name="Freeform 33">
               <a:extLst>
                 <a:ext uri="{FF2B5EF4-FFF2-40B4-BE49-F238E27FC236}">
-                  <a16:creationId xmlns:a16="http://schemas.microsoft.com/office/drawing/2014/main" xmlns="" id="{B353D0BC-00A6-4EA4-9311-9FCB88CC2021}"/>
+                  <a16:creationId xmlns="" xmlns:a16="http://schemas.microsoft.com/office/drawing/2014/main" id="{B353D0BC-00A6-4EA4-9311-9FCB88CC2021}"/>
                 </a:ext>
               </a:extLst>
             </p:cNvPr>
@@ -6490,7 +6490,7 @@
             <p:cNvPr id="48" name="Freeform 34">
               <a:extLst>
                 <a:ext uri="{FF2B5EF4-FFF2-40B4-BE49-F238E27FC236}">
-                  <a16:creationId xmlns:a16="http://schemas.microsoft.com/office/drawing/2014/main" xmlns="" id="{0E001FD3-6EDD-47A3-9916-826E1595DAB3}"/>
+                  <a16:creationId xmlns="" xmlns:a16="http://schemas.microsoft.com/office/drawing/2014/main" id="{0E001FD3-6EDD-47A3-9916-826E1595DAB3}"/>
                 </a:ext>
               </a:extLst>
             </p:cNvPr>
@@ -6572,7 +6572,7 @@
             <p:cNvPr id="49" name="Freeform 35">
               <a:extLst>
                 <a:ext uri="{FF2B5EF4-FFF2-40B4-BE49-F238E27FC236}">
-                  <a16:creationId xmlns:a16="http://schemas.microsoft.com/office/drawing/2014/main" xmlns="" id="{FE214D5B-D151-4E09-A01E-BEAAF9C679ED}"/>
+                  <a16:creationId xmlns="" xmlns:a16="http://schemas.microsoft.com/office/drawing/2014/main" id="{FE214D5B-D151-4E09-A01E-BEAAF9C679ED}"/>
                 </a:ext>
               </a:extLst>
             </p:cNvPr>
@@ -6654,7 +6654,7 @@
             <p:cNvPr id="50" name="Freeform 36">
               <a:extLst>
                 <a:ext uri="{FF2B5EF4-FFF2-40B4-BE49-F238E27FC236}">
-                  <a16:creationId xmlns:a16="http://schemas.microsoft.com/office/drawing/2014/main" xmlns="" id="{3024EF13-0A45-49DD-B0F4-FA3A5169EFFE}"/>
+                  <a16:creationId xmlns="" xmlns:a16="http://schemas.microsoft.com/office/drawing/2014/main" id="{3024EF13-0A45-49DD-B0F4-FA3A5169EFFE}"/>
                 </a:ext>
               </a:extLst>
             </p:cNvPr>
@@ -6736,7 +6736,7 @@
             <p:cNvPr id="51" name="Freeform 37">
               <a:extLst>
                 <a:ext uri="{FF2B5EF4-FFF2-40B4-BE49-F238E27FC236}">
-                  <a16:creationId xmlns:a16="http://schemas.microsoft.com/office/drawing/2014/main" xmlns="" id="{95E0BDAE-48A7-4752-A150-74DA4BAE5E4B}"/>
+                  <a16:creationId xmlns="" xmlns:a16="http://schemas.microsoft.com/office/drawing/2014/main" id="{95E0BDAE-48A7-4752-A150-74DA4BAE5E4B}"/>
                 </a:ext>
               </a:extLst>
             </p:cNvPr>
@@ -6818,7 +6818,7 @@
             <p:cNvPr id="52" name="Freeform 38">
               <a:extLst>
                 <a:ext uri="{FF2B5EF4-FFF2-40B4-BE49-F238E27FC236}">
-                  <a16:creationId xmlns:a16="http://schemas.microsoft.com/office/drawing/2014/main" xmlns="" id="{DE128EDB-3179-4F47-8B37-BEDE3B82FFC7}"/>
+                  <a16:creationId xmlns="" xmlns:a16="http://schemas.microsoft.com/office/drawing/2014/main" id="{DE128EDB-3179-4F47-8B37-BEDE3B82FFC7}"/>
                 </a:ext>
               </a:extLst>
             </p:cNvPr>
@@ -6900,7 +6900,7 @@
             <p:cNvPr id="53" name="Freeform 39">
               <a:extLst>
                 <a:ext uri="{FF2B5EF4-FFF2-40B4-BE49-F238E27FC236}">
-                  <a16:creationId xmlns:a16="http://schemas.microsoft.com/office/drawing/2014/main" xmlns="" id="{E09CDD49-7B7B-42C0-A09E-6CFB3CDFF6A1}"/>
+                  <a16:creationId xmlns="" xmlns:a16="http://schemas.microsoft.com/office/drawing/2014/main" id="{E09CDD49-7B7B-42C0-A09E-6CFB3CDFF6A1}"/>
                 </a:ext>
               </a:extLst>
             </p:cNvPr>
@@ -6982,7 +6982,7 @@
             <p:cNvPr id="54" name="Freeform 40">
               <a:extLst>
                 <a:ext uri="{FF2B5EF4-FFF2-40B4-BE49-F238E27FC236}">
-                  <a16:creationId xmlns:a16="http://schemas.microsoft.com/office/drawing/2014/main" xmlns="" id="{93C5D839-4CD5-4165-9091-7D9B92CDC1D2}"/>
+                  <a16:creationId xmlns="" xmlns:a16="http://schemas.microsoft.com/office/drawing/2014/main" id="{93C5D839-4CD5-4165-9091-7D9B92CDC1D2}"/>
                 </a:ext>
               </a:extLst>
             </p:cNvPr>
@@ -7064,7 +7064,7 @@
             <p:cNvPr id="55" name="Freeform 41">
               <a:extLst>
                 <a:ext uri="{FF2B5EF4-FFF2-40B4-BE49-F238E27FC236}">
-                  <a16:creationId xmlns:a16="http://schemas.microsoft.com/office/drawing/2014/main" xmlns="" id="{3C7F638A-BB6D-4B24-A7F9-03BF8087459B}"/>
+                  <a16:creationId xmlns="" xmlns:a16="http://schemas.microsoft.com/office/drawing/2014/main" id="{3C7F638A-BB6D-4B24-A7F9-03BF8087459B}"/>
                 </a:ext>
               </a:extLst>
             </p:cNvPr>
@@ -7146,7 +7146,7 @@
             <p:cNvPr id="56" name="Freeform 42">
               <a:extLst>
                 <a:ext uri="{FF2B5EF4-FFF2-40B4-BE49-F238E27FC236}">
-                  <a16:creationId xmlns:a16="http://schemas.microsoft.com/office/drawing/2014/main" xmlns="" id="{5B59DB64-329B-45EA-8A67-4213A886B5B2}"/>
+                  <a16:creationId xmlns="" xmlns:a16="http://schemas.microsoft.com/office/drawing/2014/main" id="{5B59DB64-329B-45EA-8A67-4213A886B5B2}"/>
                 </a:ext>
               </a:extLst>
             </p:cNvPr>
@@ -7228,7 +7228,7 @@
             <p:cNvPr id="57" name="Freeform 44">
               <a:extLst>
                 <a:ext uri="{FF2B5EF4-FFF2-40B4-BE49-F238E27FC236}">
-                  <a16:creationId xmlns:a16="http://schemas.microsoft.com/office/drawing/2014/main" xmlns="" id="{D8DAB003-6484-4D1D-85AE-93FA09BC5EF5}"/>
+                  <a16:creationId xmlns="" xmlns:a16="http://schemas.microsoft.com/office/drawing/2014/main" id="{D8DAB003-6484-4D1D-85AE-93FA09BC5EF5}"/>
                 </a:ext>
               </a:extLst>
             </p:cNvPr>
@@ -7310,7 +7310,7 @@
             <p:cNvPr id="58" name="Freeform 45">
               <a:extLst>
                 <a:ext uri="{FF2B5EF4-FFF2-40B4-BE49-F238E27FC236}">
-                  <a16:creationId xmlns:a16="http://schemas.microsoft.com/office/drawing/2014/main" xmlns="" id="{D49280A1-ACA8-4CD6-9012-AF12660F07E4}"/>
+                  <a16:creationId xmlns="" xmlns:a16="http://schemas.microsoft.com/office/drawing/2014/main" id="{D49280A1-ACA8-4CD6-9012-AF12660F07E4}"/>
                 </a:ext>
               </a:extLst>
             </p:cNvPr>
@@ -7392,7 +7392,7 @@
             <p:cNvPr id="59" name="Freeform 46">
               <a:extLst>
                 <a:ext uri="{FF2B5EF4-FFF2-40B4-BE49-F238E27FC236}">
-                  <a16:creationId xmlns:a16="http://schemas.microsoft.com/office/drawing/2014/main" xmlns="" id="{C03EAE8C-6089-40E5-9361-2E266A1EEBA3}"/>
+                  <a16:creationId xmlns="" xmlns:a16="http://schemas.microsoft.com/office/drawing/2014/main" id="{C03EAE8C-6089-40E5-9361-2E266A1EEBA3}"/>
                 </a:ext>
               </a:extLst>
             </p:cNvPr>
@@ -7474,7 +7474,7 @@
             <p:cNvPr id="60" name="Freeform 47">
               <a:extLst>
                 <a:ext uri="{FF2B5EF4-FFF2-40B4-BE49-F238E27FC236}">
-                  <a16:creationId xmlns:a16="http://schemas.microsoft.com/office/drawing/2014/main" xmlns="" id="{02E3A077-F087-4E14-A13E-4E9D4369B1F6}"/>
+                  <a16:creationId xmlns="" xmlns:a16="http://schemas.microsoft.com/office/drawing/2014/main" id="{02E3A077-F087-4E14-A13E-4E9D4369B1F6}"/>
                 </a:ext>
               </a:extLst>
             </p:cNvPr>
@@ -7556,7 +7556,7 @@
             <p:cNvPr id="61" name="Freeform 48">
               <a:extLst>
                 <a:ext uri="{FF2B5EF4-FFF2-40B4-BE49-F238E27FC236}">
-                  <a16:creationId xmlns:a16="http://schemas.microsoft.com/office/drawing/2014/main" xmlns="" id="{7CE4FAAA-45E7-4C86-B59A-F284B79EFD23}"/>
+                  <a16:creationId xmlns="" xmlns:a16="http://schemas.microsoft.com/office/drawing/2014/main" id="{7CE4FAAA-45E7-4C86-B59A-F284B79EFD23}"/>
                 </a:ext>
               </a:extLst>
             </p:cNvPr>
@@ -7638,7 +7638,7 @@
             <p:cNvPr id="62" name="Freeform 49">
               <a:extLst>
                 <a:ext uri="{FF2B5EF4-FFF2-40B4-BE49-F238E27FC236}">
-                  <a16:creationId xmlns:a16="http://schemas.microsoft.com/office/drawing/2014/main" xmlns="" id="{E2689B62-CCA1-4EE5-B622-FBA516868916}"/>
+                  <a16:creationId xmlns="" xmlns:a16="http://schemas.microsoft.com/office/drawing/2014/main" id="{E2689B62-CCA1-4EE5-B622-FBA516868916}"/>
                 </a:ext>
               </a:extLst>
             </p:cNvPr>
@@ -7720,7 +7720,7 @@
             <p:cNvPr id="63" name="Freeform 8">
               <a:extLst>
                 <a:ext uri="{FF2B5EF4-FFF2-40B4-BE49-F238E27FC236}">
-                  <a16:creationId xmlns:a16="http://schemas.microsoft.com/office/drawing/2014/main" xmlns="" id="{113638EE-3BCF-4315-A329-3C6766A3890B}"/>
+                  <a16:creationId xmlns="" xmlns:a16="http://schemas.microsoft.com/office/drawing/2014/main" id="{113638EE-3BCF-4315-A329-3C6766A3890B}"/>
                 </a:ext>
               </a:extLst>
             </p:cNvPr>
@@ -7802,7 +7802,7 @@
             <p:cNvPr id="64" name="Freeform 106">
               <a:extLst>
                 <a:ext uri="{FF2B5EF4-FFF2-40B4-BE49-F238E27FC236}">
-                  <a16:creationId xmlns:a16="http://schemas.microsoft.com/office/drawing/2014/main" xmlns="" id="{4FB36B8F-335B-40F2-83BB-C2B2689DC2E9}"/>
+                  <a16:creationId xmlns="" xmlns:a16="http://schemas.microsoft.com/office/drawing/2014/main" id="{4FB36B8F-335B-40F2-83BB-C2B2689DC2E9}"/>
                 </a:ext>
               </a:extLst>
             </p:cNvPr>
@@ -7885,7 +7885,7 @@
           <p:cNvPr id="2" name="Title Placeholder 1">
             <a:extLst>
               <a:ext uri="{FF2B5EF4-FFF2-40B4-BE49-F238E27FC236}">
-                <a16:creationId xmlns:a16="http://schemas.microsoft.com/office/drawing/2014/main" xmlns="" id="{7A05E913-A9D9-4639-B104-1F07A4AF6A56}"/>
+                <a16:creationId xmlns="" xmlns:a16="http://schemas.microsoft.com/office/drawing/2014/main" id="{7A05E913-A9D9-4639-B104-1F07A4AF6A56}"/>
               </a:ext>
             </a:extLst>
           </p:cNvPr>
@@ -7923,7 +7923,7 @@
           <p:cNvPr id="3" name="Text Placeholder 2">
             <a:extLst>
               <a:ext uri="{FF2B5EF4-FFF2-40B4-BE49-F238E27FC236}">
-                <a16:creationId xmlns:a16="http://schemas.microsoft.com/office/drawing/2014/main" xmlns="" id="{09940CEB-B6D7-46E6-9843-51534214017A}"/>
+                <a16:creationId xmlns="" xmlns:a16="http://schemas.microsoft.com/office/drawing/2014/main" id="{09940CEB-B6D7-46E6-9843-51534214017A}"/>
               </a:ext>
             </a:extLst>
           </p:cNvPr>
@@ -7990,7 +7990,7 @@
           <p:cNvPr id="4" name="Date Placeholder 3">
             <a:extLst>
               <a:ext uri="{FF2B5EF4-FFF2-40B4-BE49-F238E27FC236}">
-                <a16:creationId xmlns:a16="http://schemas.microsoft.com/office/drawing/2014/main" xmlns="" id="{B5BAC8B5-8DFB-4920-8580-54824C831A94}"/>
+                <a16:creationId xmlns="" xmlns:a16="http://schemas.microsoft.com/office/drawing/2014/main" id="{B5BAC8B5-8DFB-4920-8580-54824C831A94}"/>
               </a:ext>
             </a:extLst>
           </p:cNvPr>
@@ -8036,7 +8036,7 @@
           <p:cNvPr id="5" name="Footer Placeholder 4">
             <a:extLst>
               <a:ext uri="{FF2B5EF4-FFF2-40B4-BE49-F238E27FC236}">
-                <a16:creationId xmlns:a16="http://schemas.microsoft.com/office/drawing/2014/main" xmlns="" id="{3A9E2D5D-B616-4048-9CB8-4D316BBDB1FB}"/>
+                <a16:creationId xmlns="" xmlns:a16="http://schemas.microsoft.com/office/drawing/2014/main" id="{3A9E2D5D-B616-4048-9CB8-4D316BBDB1FB}"/>
               </a:ext>
             </a:extLst>
           </p:cNvPr>
@@ -8077,7 +8077,7 @@
           <p:cNvPr id="6" name="Slide Number Placeholder 5">
             <a:extLst>
               <a:ext uri="{FF2B5EF4-FFF2-40B4-BE49-F238E27FC236}">
-                <a16:creationId xmlns:a16="http://schemas.microsoft.com/office/drawing/2014/main" xmlns="" id="{63F322F0-8F3D-4AC5-9873-24666D0E0D34}"/>
+                <a16:creationId xmlns="" xmlns:a16="http://schemas.microsoft.com/office/drawing/2014/main" id="{63F322F0-8F3D-4AC5-9873-24666D0E0D34}"/>
               </a:ext>
             </a:extLst>
           </p:cNvPr>
@@ -8121,7 +8121,7 @@
     </p:spTree>
     <p:extLst>
       <p:ext uri="{BB962C8B-B14F-4D97-AF65-F5344CB8AC3E}">
-        <p14:creationId xmlns:p14="http://schemas.microsoft.com/office/powerpoint/2010/main" xmlns="" val="3169733250"/>
+        <p14:creationId xmlns="" xmlns:p14="http://schemas.microsoft.com/office/powerpoint/2010/main" val="3169733250"/>
       </p:ext>
     </p:extLst>
   </p:cSld>
@@ -8469,7 +8469,7 @@
           <p:cNvPr id="2" name="Title 1">
             <a:extLst>
               <a:ext uri="{FF2B5EF4-FFF2-40B4-BE49-F238E27FC236}">
-                <a16:creationId xmlns:a16="http://schemas.microsoft.com/office/drawing/2014/main" xmlns="" id="{51E935BB-DDE4-429A-8AA8-6CA219F8E6F2}"/>
+                <a16:creationId xmlns="" xmlns:a16="http://schemas.microsoft.com/office/drawing/2014/main" id="{51E935BB-DDE4-429A-8AA8-6CA219F8E6F2}"/>
               </a:ext>
             </a:extLst>
           </p:cNvPr>
@@ -8496,7 +8496,6 @@
               <a:rPr lang="en-AU" sz="4400" b="1" dirty="0" smtClean="0"/>
               <a:t>Overview Victoria Crimes &amp; Family Incidents</a:t>
             </a:r>
-            <a:endParaRPr lang="en-AU" sz="4400" b="1" dirty="0" smtClean="0"/>
           </a:p>
         </p:txBody>
       </p:sp>
@@ -8505,7 +8504,7 @@
           <p:cNvPr id="3" name="Subtitle 2">
             <a:extLst>
               <a:ext uri="{FF2B5EF4-FFF2-40B4-BE49-F238E27FC236}">
-                <a16:creationId xmlns:a16="http://schemas.microsoft.com/office/drawing/2014/main" xmlns="" id="{2FB96A9D-2972-44C3-A420-67F66A13B236}"/>
+                <a16:creationId xmlns="" xmlns:a16="http://schemas.microsoft.com/office/drawing/2014/main" id="{2FB96A9D-2972-44C3-A420-67F66A13B236}"/>
               </a:ext>
             </a:extLst>
           </p:cNvPr>
@@ -8544,7 +8543,7 @@
           <p:cNvPr id="7" name="Picture 2" descr="Image result for nightimepic of victoria australia">
             <a:extLst>
               <a:ext uri="{FF2B5EF4-FFF2-40B4-BE49-F238E27FC236}">
-                <a16:creationId xmlns:a16="http://schemas.microsoft.com/office/drawing/2014/main" xmlns="" id="{07E1A4A3-CD91-44FC-87E7-5565C6373211}"/>
+                <a16:creationId xmlns="" xmlns:a16="http://schemas.microsoft.com/office/drawing/2014/main" id="{07E1A4A3-CD91-44FC-87E7-5565C6373211}"/>
               </a:ext>
             </a:extLst>
           </p:cNvPr>
@@ -8557,7 +8556,7 @@
           <a:blip r:embed="rId2" cstate="print">
             <a:extLst>
               <a:ext uri="{28A0092B-C50C-407E-A947-70E740481C1C}">
-                <a14:useLocalDpi xmlns:a14="http://schemas.microsoft.com/office/drawing/2010/main" xmlns="" val="0"/>
+                <a14:useLocalDpi xmlns="" xmlns:a14="http://schemas.microsoft.com/office/drawing/2010/main" val="0"/>
               </a:ext>
             </a:extLst>
           </a:blip>
@@ -8575,7 +8574,7 @@
           <a:noFill/>
           <a:extLst>
             <a:ext uri="{909E8E84-426E-40DD-AFC4-6F175D3DCCD1}">
-              <a14:hiddenFill xmlns:a14="http://schemas.microsoft.com/office/drawing/2010/main" xmlns="">
+              <a14:hiddenFill xmlns="" xmlns:a14="http://schemas.microsoft.com/office/drawing/2010/main">
                 <a:solidFill>
                   <a:srgbClr val="FFFFFF"/>
                 </a:solidFill>
@@ -8589,7 +8588,7 @@
           <p:cNvPr id="6" name="Picture 4" descr="See the source image">
             <a:extLst>
               <a:ext uri="{FF2B5EF4-FFF2-40B4-BE49-F238E27FC236}">
-                <a16:creationId xmlns:a16="http://schemas.microsoft.com/office/drawing/2014/main" xmlns="" id="{8978232E-0577-4FB1-9D9A-7A417CBDD9B3}"/>
+                <a16:creationId xmlns="" xmlns:a16="http://schemas.microsoft.com/office/drawing/2014/main" id="{8978232E-0577-4FB1-9D9A-7A417CBDD9B3}"/>
               </a:ext>
             </a:extLst>
           </p:cNvPr>
@@ -8602,7 +8601,7 @@
           <a:blip r:embed="rId3" cstate="print">
             <a:extLst>
               <a:ext uri="{28A0092B-C50C-407E-A947-70E740481C1C}">
-                <a14:useLocalDpi xmlns:a14="http://schemas.microsoft.com/office/drawing/2010/main" xmlns="" val="0"/>
+                <a14:useLocalDpi xmlns="" xmlns:a14="http://schemas.microsoft.com/office/drawing/2010/main" val="0"/>
               </a:ext>
             </a:extLst>
           </a:blip>
@@ -8620,7 +8619,7 @@
           <a:noFill/>
           <a:extLst>
             <a:ext uri="{909E8E84-426E-40DD-AFC4-6F175D3DCCD1}">
-              <a14:hiddenFill xmlns:a14="http://schemas.microsoft.com/office/drawing/2010/main" xmlns="">
+              <a14:hiddenFill xmlns="" xmlns:a14="http://schemas.microsoft.com/office/drawing/2010/main">
                 <a:solidFill>
                   <a:srgbClr val="FFFFFF"/>
                 </a:solidFill>
@@ -8632,7 +8631,7 @@
     </p:spTree>
     <p:extLst>
       <p:ext uri="{BB962C8B-B14F-4D97-AF65-F5344CB8AC3E}">
-        <p14:creationId xmlns:p14="http://schemas.microsoft.com/office/powerpoint/2010/main" xmlns="" val="3272309628"/>
+        <p14:creationId xmlns="" xmlns:p14="http://schemas.microsoft.com/office/powerpoint/2010/main" val="3272309628"/>
       </p:ext>
     </p:extLst>
   </p:cSld>
@@ -8817,7 +8816,7 @@
           <p:cNvPr id="2" name="Title 1">
             <a:extLst>
               <a:ext uri="{FF2B5EF4-FFF2-40B4-BE49-F238E27FC236}">
-                <a16:creationId xmlns:a16="http://schemas.microsoft.com/office/drawing/2014/main" xmlns="" id="{A4F9A5E3-95C5-4F3E-80A5-1BD7B12920D3}"/>
+                <a16:creationId xmlns="" xmlns:a16="http://schemas.microsoft.com/office/drawing/2014/main" id="{A4F9A5E3-95C5-4F3E-80A5-1BD7B12920D3}"/>
               </a:ext>
             </a:extLst>
           </p:cNvPr>
@@ -8915,11 +8914,7 @@
           <a:p>
             <a:r>
               <a:rPr lang="en-US" b="1" dirty="0" smtClean="0"/>
-              <a:t>Criminal </a:t>
-            </a:r>
-            <a:r>
-              <a:rPr lang="en-US" b="1" dirty="0" smtClean="0"/>
-              <a:t>incident</a:t>
+              <a:t>Criminal incident</a:t>
             </a:r>
           </a:p>
           <a:p>
@@ -8928,15 +8923,7 @@
           <a:p>
             <a:r>
               <a:rPr lang="en-US" sz="1600" dirty="0" smtClean="0"/>
-              <a:t>A criminal event that may include multiple offences, alleged offenders and/or victims, is recorded </a:t>
-            </a:r>
-            <a:r>
-              <a:rPr lang="en-US" sz="1600" dirty="0" smtClean="0"/>
-              <a:t>on </a:t>
-            </a:r>
-            <a:r>
-              <a:rPr lang="en-US" sz="1600" dirty="0" smtClean="0"/>
-              <a:t>a single date and as occurring at one location.</a:t>
+              <a:t>A criminal event that may include multiple offences, alleged offenders and/or victims, is recorded on a single date and as occurring at one location.</a:t>
             </a:r>
             <a:endParaRPr lang="en-US" sz="1600" dirty="0"/>
           </a:p>
@@ -8965,11 +8952,7 @@
           <a:p>
             <a:r>
               <a:rPr lang="en-US" b="1" dirty="0" smtClean="0"/>
-              <a:t>Family </a:t>
-            </a:r>
-            <a:r>
-              <a:rPr lang="en-US" b="1" dirty="0" smtClean="0"/>
-              <a:t>incident</a:t>
+              <a:t>Family incident</a:t>
             </a:r>
           </a:p>
           <a:p>
@@ -8978,15 +8961,7 @@
           <a:p>
             <a:r>
               <a:rPr lang="en-US" sz="1600" dirty="0" smtClean="0"/>
-              <a:t>An incident attended by Victoria Police where a Risk Assessment and Risk Management Report (also known as an L17 form) was completed. The report is completed when family violence incidents, interfamilial-related sexual offences, and child abuse are reported to </a:t>
-            </a:r>
-            <a:r>
-              <a:rPr lang="en-US" sz="1600" dirty="0" smtClean="0"/>
-              <a:t>police</a:t>
-            </a:r>
-            <a:r>
-              <a:rPr lang="en-US" sz="1600" dirty="0" smtClean="0"/>
-              <a:t>.</a:t>
+              <a:t>An incident attended by Victoria Police where a Risk Assessment and Risk Management Report (also known as an L17 form) was completed. The report is completed when family violence incidents, interfamilial-related sexual offences, and child abuse are reported to police.</a:t>
             </a:r>
           </a:p>
         </p:txBody>
@@ -9014,11 +8989,7 @@
           <a:p>
             <a:r>
               <a:rPr lang="en-US" b="1" dirty="0" smtClean="0"/>
-              <a:t>Victim </a:t>
-            </a:r>
-            <a:r>
-              <a:rPr lang="en-US" b="1" dirty="0" smtClean="0"/>
-              <a:t>report</a:t>
+              <a:t>Victim report</a:t>
             </a:r>
           </a:p>
           <a:p>
@@ -9044,7 +9015,7 @@
     </p:spTree>
     <p:extLst>
       <p:ext uri="{BB962C8B-B14F-4D97-AF65-F5344CB8AC3E}">
-        <p14:creationId xmlns:p14="http://schemas.microsoft.com/office/powerpoint/2010/main" xmlns="" val="4047589959"/>
+        <p14:creationId xmlns="" xmlns:p14="http://schemas.microsoft.com/office/powerpoint/2010/main" val="4047589959"/>
       </p:ext>
     </p:extLst>
   </p:cSld>
@@ -9076,7 +9047,7 @@
           <p:cNvPr id="2" name="Title 1">
             <a:extLst>
               <a:ext uri="{FF2B5EF4-FFF2-40B4-BE49-F238E27FC236}">
-                <a16:creationId xmlns:a16="http://schemas.microsoft.com/office/drawing/2014/main" xmlns="" id="{A4F9A5E3-95C5-4F3E-80A5-1BD7B12920D3}"/>
+                <a16:creationId xmlns="" xmlns:a16="http://schemas.microsoft.com/office/drawing/2014/main" id="{A4F9A5E3-95C5-4F3E-80A5-1BD7B12920D3}"/>
               </a:ext>
             </a:extLst>
           </p:cNvPr>
@@ -9261,7 +9232,7 @@
     </p:spTree>
     <p:extLst>
       <p:ext uri="{BB962C8B-B14F-4D97-AF65-F5344CB8AC3E}">
-        <p14:creationId xmlns:p14="http://schemas.microsoft.com/office/powerpoint/2010/main" xmlns="" val="4047589959"/>
+        <p14:creationId xmlns="" xmlns:p14="http://schemas.microsoft.com/office/powerpoint/2010/main" val="4047589959"/>
       </p:ext>
     </p:extLst>
   </p:cSld>
@@ -9293,7 +9264,7 @@
           <p:cNvPr id="2" name="Title 1">
             <a:extLst>
               <a:ext uri="{FF2B5EF4-FFF2-40B4-BE49-F238E27FC236}">
-                <a16:creationId xmlns:a16="http://schemas.microsoft.com/office/drawing/2014/main" xmlns="" id="{A4F9A5E3-95C5-4F3E-80A5-1BD7B12920D3}"/>
+                <a16:creationId xmlns="" xmlns:a16="http://schemas.microsoft.com/office/drawing/2014/main" id="{A4F9A5E3-95C5-4F3E-80A5-1BD7B12920D3}"/>
               </a:ext>
             </a:extLst>
           </p:cNvPr>
@@ -9475,11 +9446,7 @@
           <a:p>
             <a:r>
               <a:rPr lang="en-AU" sz="1600" dirty="0" smtClean="0"/>
-              <a:t>Percentage </a:t>
-            </a:r>
-            <a:r>
-              <a:rPr lang="en-AU" sz="1600" dirty="0" smtClean="0"/>
-              <a:t>Changes of Number of Incidents and Offences</a:t>
+              <a:t>Percentage Changes of Number of Incidents and Offences</a:t>
             </a:r>
             <a:endParaRPr lang="en-US" sz="1600" dirty="0"/>
           </a:p>
@@ -9520,7 +9487,7 @@
     </p:spTree>
     <p:extLst>
       <p:ext uri="{BB962C8B-B14F-4D97-AF65-F5344CB8AC3E}">
-        <p14:creationId xmlns:p14="http://schemas.microsoft.com/office/powerpoint/2010/main" xmlns="" val="4047589959"/>
+        <p14:creationId xmlns="" xmlns:p14="http://schemas.microsoft.com/office/powerpoint/2010/main" val="4047589959"/>
       </p:ext>
     </p:extLst>
   </p:cSld>
@@ -9584,7 +9551,7 @@
           <p:cNvPr id="2" name="Title 1">
             <a:extLst>
               <a:ext uri="{FF2B5EF4-FFF2-40B4-BE49-F238E27FC236}">
-                <a16:creationId xmlns:a16="http://schemas.microsoft.com/office/drawing/2014/main" xmlns="" id="{A4F9A5E3-95C5-4F3E-80A5-1BD7B12920D3}"/>
+                <a16:creationId xmlns="" xmlns:a16="http://schemas.microsoft.com/office/drawing/2014/main" id="{A4F9A5E3-95C5-4F3E-80A5-1BD7B12920D3}"/>
               </a:ext>
             </a:extLst>
           </p:cNvPr>
@@ -9747,7 +9714,7 @@
     </p:spTree>
     <p:extLst>
       <p:ext uri="{BB962C8B-B14F-4D97-AF65-F5344CB8AC3E}">
-        <p14:creationId xmlns:p14="http://schemas.microsoft.com/office/powerpoint/2010/main" xmlns="" val="4047589959"/>
+        <p14:creationId xmlns="" xmlns:p14="http://schemas.microsoft.com/office/powerpoint/2010/main" val="4047589959"/>
       </p:ext>
     </p:extLst>
   </p:cSld>
@@ -9786,7 +9753,7 @@
           <p:cNvPr id="2" name="Title 1">
             <a:extLst>
               <a:ext uri="{FF2B5EF4-FFF2-40B4-BE49-F238E27FC236}">
-                <a16:creationId xmlns:a16="http://schemas.microsoft.com/office/drawing/2014/main" xmlns="" id="{A4F9A5E3-95C5-4F3E-80A5-1BD7B12920D3}"/>
+                <a16:creationId xmlns="" xmlns:a16="http://schemas.microsoft.com/office/drawing/2014/main" id="{A4F9A5E3-95C5-4F3E-80A5-1BD7B12920D3}"/>
               </a:ext>
             </a:extLst>
           </p:cNvPr>
@@ -9827,7 +9794,7 @@
         </p:nvGraphicFramePr>
         <p:xfrm>
           <a:off x="294107" y="1361350"/>
-          <a:ext cx="10871198" cy="3459480"/>
+          <a:ext cx="10871198" cy="3489960"/>
         </p:xfrm>
         <a:graphic>
           <a:graphicData uri="http://schemas.openxmlformats.org/drawingml/2006/table">
@@ -9837,9 +9804,9 @@
               </a:tblPr>
               <a:tblGrid>
                 <a:gridCol w="2714996"/>
-                <a:gridCol w="2339157"/>
-                <a:gridCol w="2911326"/>
-                <a:gridCol w="2905719"/>
+                <a:gridCol w="2263402"/>
+                <a:gridCol w="2550695"/>
+                <a:gridCol w="3342105"/>
               </a:tblGrid>
               <a:tr h="370840">
                 <a:tc>
@@ -9899,7 +9866,15 @@
                       <a:pPr algn="ctr"/>
                       <a:r>
                         <a:rPr lang="en-AU" sz="2000" dirty="0" smtClean="0"/>
-                        <a:t>Highest Percentage Change </a:t>
+                        <a:t>Highest </a:t>
+                      </a:r>
+                      <a:r>
+                        <a:rPr lang="en-AU" sz="2000" dirty="0" smtClean="0"/>
+                        <a:t>Yearly Percentage </a:t>
+                      </a:r>
+                      <a:r>
+                        <a:rPr lang="en-AU" sz="2000" dirty="0" smtClean="0"/>
+                        <a:t>Change </a:t>
                       </a:r>
                       <a:endParaRPr lang="en-US" sz="2000" dirty="0"/>
                     </a:p>
@@ -9963,7 +9938,19 @@
                       <a:pPr algn="ctr"/>
                       <a:r>
                         <a:rPr lang="en-AU" sz="1600" dirty="0" smtClean="0"/>
-                        <a:t>2014, 2017, 2019</a:t>
+                        <a:t>2014, </a:t>
+                      </a:r>
+                      <a:r>
+                        <a:rPr lang="en-AU" sz="1600" dirty="0" smtClean="0">
+                          <a:solidFill>
+                            <a:srgbClr val="00B050"/>
+                          </a:solidFill>
+                        </a:rPr>
+                        <a:t>2017</a:t>
+                      </a:r>
+                      <a:r>
+                        <a:rPr lang="en-AU" sz="1600" dirty="0" smtClean="0"/>
+                        <a:t>, 2019</a:t>
                       </a:r>
                       <a:endParaRPr lang="en-US" sz="1600" dirty="0"/>
                     </a:p>
@@ -9975,17 +9962,135 @@
                     <a:bodyPr/>
                     <a:lstStyle/>
                     <a:p>
-                      <a:pPr algn="ctr"/>
+                      <a:pPr marL="0" marR="0" indent="0" algn="ctr" defTabSz="914400" rtl="0" eaLnBrk="1" fontAlgn="auto" latinLnBrk="0" hangingPunct="1">
+                        <a:lnSpc>
+                          <a:spcPct val="100000"/>
+                        </a:lnSpc>
+                        <a:spcBef>
+                          <a:spcPts val="0"/>
+                        </a:spcBef>
+                        <a:spcAft>
+                          <a:spcPts val="0"/>
+                        </a:spcAft>
+                        <a:buClrTx/>
+                        <a:buSzTx/>
+                        <a:buFontTx/>
+                        <a:buNone/>
+                        <a:tabLst/>
+                        <a:defRPr/>
+                      </a:pPr>
+                      <a:r>
+                        <a:rPr lang="en-US" sz="1800" kern="1200" dirty="0" smtClean="0">
+                          <a:solidFill>
+                            <a:srgbClr val="FF0000"/>
+                          </a:solidFill>
+                          <a:latin typeface="Wingdings 3" pitchFamily="18" charset="2"/>
+                          <a:ea typeface="+mn-ea"/>
+                          <a:cs typeface="+mn-cs"/>
+                        </a:rPr>
+                        <a:t>Ÿ</a:t>
+                      </a:r>
                       <a:r>
                         <a:rPr lang="en-AU" sz="1600" dirty="0" smtClean="0"/>
-                        <a:t>0.05, 0.07, 0.06</a:t>
+                        <a:t>0.05, </a:t>
+                      </a:r>
+                      <a:r>
+                        <a:rPr lang="en-US" sz="1600" kern="1200" dirty="0" smtClean="0">
+                          <a:solidFill>
+                            <a:srgbClr val="FF0000"/>
+                          </a:solidFill>
+                          <a:latin typeface="Wingdings 3" pitchFamily="18" charset="2"/>
+                          <a:ea typeface="+mn-ea"/>
+                          <a:cs typeface="+mn-cs"/>
+                        </a:rPr>
+                        <a:t>Ÿ</a:t>
+                      </a:r>
+                      <a:r>
+                        <a:rPr lang="en-AU" sz="1600" dirty="0" smtClean="0"/>
+                        <a:t>0.07, </a:t>
+                      </a:r>
+                      <a:r>
+                        <a:rPr lang="en-US" sz="1600" kern="1200" dirty="0" smtClean="0">
+                          <a:solidFill>
+                            <a:srgbClr val="FF0000"/>
+                          </a:solidFill>
+                          <a:latin typeface="Wingdings 3" pitchFamily="18" charset="2"/>
+                          <a:ea typeface="+mn-ea"/>
+                          <a:cs typeface="+mn-cs"/>
+                        </a:rPr>
+                        <a:t>Ÿ</a:t>
+                      </a:r>
+                      <a:r>
+                        <a:rPr lang="en-AU" sz="1600" dirty="0" smtClean="0"/>
+                        <a:t>0.06</a:t>
                       </a:r>
                     </a:p>
                     <a:p>
                       <a:pPr algn="ctr"/>
                       <a:r>
+                        <a:rPr lang="en-US" sz="1600" kern="1200" dirty="0" smtClean="0">
+                          <a:solidFill>
+                            <a:srgbClr val="FF0000"/>
+                          </a:solidFill>
+                          <a:latin typeface="Wingdings 3" pitchFamily="18" charset="2"/>
+                          <a:ea typeface="+mn-ea"/>
+                          <a:cs typeface="+mn-cs"/>
+                        </a:rPr>
+                        <a:t>Ÿ</a:t>
+                      </a:r>
+                      <a:r>
                         <a:rPr lang="en-AU" sz="1600" dirty="0" smtClean="0"/>
-                        <a:t>0.05, -0.01, 0.08</a:t>
+                        <a:t>0.05</a:t>
+                      </a:r>
+                      <a:r>
+                        <a:rPr lang="en-AU" sz="1600" dirty="0" smtClean="0"/>
+                        <a:t>, </a:t>
+                      </a:r>
+                      <a:r>
+                        <a:rPr lang="en-US" sz="1600" kern="1200" dirty="0" smtClean="0">
+                          <a:solidFill>
+                            <a:srgbClr val="00B050"/>
+                          </a:solidFill>
+                          <a:latin typeface="Wingdings 3" pitchFamily="18" charset="2"/>
+                          <a:ea typeface="+mn-ea"/>
+                          <a:cs typeface="+mn-cs"/>
+                        </a:rPr>
+                        <a:t>”</a:t>
+                      </a:r>
+                      <a:r>
+                        <a:rPr lang="en-AU" sz="1600" dirty="0" smtClean="0">
+                          <a:solidFill>
+                            <a:schemeClr val="tx1"/>
+                          </a:solidFill>
+                        </a:rPr>
+                        <a:t>-</a:t>
+                      </a:r>
+                      <a:r>
+                        <a:rPr lang="en-AU" sz="1600" dirty="0" smtClean="0">
+                          <a:solidFill>
+                            <a:schemeClr val="tx1"/>
+                          </a:solidFill>
+                        </a:rPr>
+                        <a:t>0.01</a:t>
+                      </a:r>
+                      <a:r>
+                        <a:rPr lang="en-AU" sz="1600" dirty="0" smtClean="0"/>
+                        <a:t>, </a:t>
+                      </a:r>
+                      <a:r>
+                        <a:rPr lang="en-US" sz="1600" kern="1200" dirty="0" smtClean="0">
+                          <a:solidFill>
+                            <a:srgbClr val="FF0000"/>
+                          </a:solidFill>
+                          <a:latin typeface="Wingdings 3" pitchFamily="18" charset="2"/>
+                          <a:ea typeface="+mn-ea"/>
+                          <a:cs typeface="+mn-cs"/>
+                        </a:rPr>
+                        <a:t>Ÿ</a:t>
+                      </a:r>
+                      <a:r>
+                        <a:rPr lang="en-AU" sz="1600" dirty="0" smtClean="0"/>
+                        <a:t>0.08</a:t>
                       </a:r>
                       <a:endParaRPr lang="en-US" sz="1600" dirty="0"/>
                     </a:p>
@@ -10031,9 +10136,21 @@
                       <a:pPr algn="ctr"/>
                       <a:r>
                         <a:rPr lang="en-AU" sz="1600" dirty="0" smtClean="0"/>
-                        <a:t>2013, 2016, 2017, 2021</a:t>
+                        <a:t>2013, 2016, </a:t>
                       </a:r>
-                      <a:endParaRPr lang="en-US" sz="1600" dirty="0"/>
+                      <a:r>
+                        <a:rPr lang="en-AU" sz="1600" dirty="0" smtClean="0">
+                          <a:solidFill>
+                            <a:srgbClr val="00B050"/>
+                          </a:solidFill>
+                        </a:rPr>
+                        <a:t>2017, 2021</a:t>
+                      </a:r>
+                      <a:endParaRPr lang="en-US" sz="1600" dirty="0">
+                        <a:solidFill>
+                          <a:srgbClr val="00B050"/>
+                        </a:solidFill>
+                      </a:endParaRPr>
                     </a:p>
                   </a:txBody>
                   <a:tcPr/>
@@ -10043,16 +10160,116 @@
                     <a:bodyPr/>
                     <a:lstStyle/>
                     <a:p>
-                      <a:pPr algn="ctr"/>
+                      <a:pPr marL="0" marR="0" indent="0" algn="ctr" defTabSz="914400" rtl="0" eaLnBrk="1" fontAlgn="auto" latinLnBrk="0" hangingPunct="1">
+                        <a:lnSpc>
+                          <a:spcPct val="100000"/>
+                        </a:lnSpc>
+                        <a:spcBef>
+                          <a:spcPts val="0"/>
+                        </a:spcBef>
+                        <a:spcAft>
+                          <a:spcPts val="0"/>
+                        </a:spcAft>
+                        <a:buClrTx/>
+                        <a:buSzTx/>
+                        <a:buFontTx/>
+                        <a:buNone/>
+                        <a:tabLst/>
+                        <a:defRPr/>
+                      </a:pPr>
+                      <a:r>
+                        <a:rPr lang="en-US" sz="1600" kern="1200" dirty="0" smtClean="0">
+                          <a:solidFill>
+                            <a:srgbClr val="FF0000"/>
+                          </a:solidFill>
+                          <a:latin typeface="Wingdings 3" pitchFamily="18" charset="2"/>
+                          <a:ea typeface="+mn-ea"/>
+                          <a:cs typeface="+mn-cs"/>
+                        </a:rPr>
+                        <a:t>Ÿ</a:t>
+                      </a:r>
                       <a:r>
                         <a:rPr lang="en-AU" sz="1600" dirty="0" smtClean="0"/>
-                        <a:t>0.09, 0.13,</a:t>
+                        <a:t>0.09</a:t>
+                      </a:r>
+                      <a:r>
+                        <a:rPr lang="en-AU" sz="1600" dirty="0" smtClean="0"/>
+                        <a:t>, </a:t>
+                      </a:r>
+                      <a:r>
+                        <a:rPr lang="en-US" sz="1600" kern="1200" dirty="0" smtClean="0">
+                          <a:solidFill>
+                            <a:srgbClr val="FF0000"/>
+                          </a:solidFill>
+                          <a:latin typeface="Wingdings 3" pitchFamily="18" charset="2"/>
+                          <a:ea typeface="+mn-ea"/>
+                          <a:cs typeface="+mn-cs"/>
+                        </a:rPr>
+                        <a:t>Ÿ</a:t>
+                      </a:r>
+                      <a:r>
+                        <a:rPr lang="en-AU" sz="1600" dirty="0" smtClean="0"/>
+                        <a:t>0.13</a:t>
+                      </a:r>
+                      <a:r>
+                        <a:rPr lang="en-AU" sz="1600" dirty="0" smtClean="0"/>
+                        <a:t>,</a:t>
                       </a:r>
                       <a:r>
                         <a:rPr lang="en-AU" sz="1600" baseline="0" dirty="0" smtClean="0"/>
-                        <a:t> -0.02, -0.06</a:t>
+                        <a:t> </a:t>
                       </a:r>
-                      <a:endParaRPr lang="en-US" sz="1600" dirty="0"/>
+                      <a:r>
+                        <a:rPr lang="en-US" sz="1800" kern="1200" dirty="0" smtClean="0">
+                          <a:solidFill>
+                            <a:srgbClr val="00B050"/>
+                          </a:solidFill>
+                          <a:latin typeface="Wingdings 3" pitchFamily="18" charset="2"/>
+                          <a:ea typeface="+mn-ea"/>
+                          <a:cs typeface="+mn-cs"/>
+                        </a:rPr>
+                        <a:t>”</a:t>
+                      </a:r>
+                      <a:r>
+                        <a:rPr lang="en-AU" sz="1600" baseline="0" dirty="0" smtClean="0"/>
+                        <a:t>-</a:t>
+                      </a:r>
+                      <a:r>
+                        <a:rPr lang="en-AU" sz="1600" baseline="0" dirty="0" smtClean="0"/>
+                        <a:t>0.02, </a:t>
+                      </a:r>
+                      <a:r>
+                        <a:rPr lang="en-US" sz="1600" kern="1200" dirty="0" smtClean="0">
+                          <a:solidFill>
+                            <a:srgbClr val="00B050"/>
+                          </a:solidFill>
+                          <a:latin typeface="Wingdings 3" pitchFamily="18" charset="2"/>
+                          <a:ea typeface="+mn-ea"/>
+                          <a:cs typeface="+mn-cs"/>
+                        </a:rPr>
+                        <a:t>”</a:t>
+                      </a:r>
+                      <a:r>
+                        <a:rPr lang="en-AU" sz="1600" baseline="0" dirty="0" smtClean="0">
+                          <a:solidFill>
+                            <a:schemeClr val="tx1"/>
+                          </a:solidFill>
+                        </a:rPr>
+                        <a:t>-</a:t>
+                      </a:r>
+                      <a:r>
+                        <a:rPr lang="en-AU" sz="1600" baseline="0" dirty="0" smtClean="0">
+                          <a:solidFill>
+                            <a:schemeClr val="tx1"/>
+                          </a:solidFill>
+                        </a:rPr>
+                        <a:t>0.06</a:t>
+                      </a:r>
+                      <a:endParaRPr lang="en-US" sz="1600" dirty="0">
+                        <a:solidFill>
+                          <a:schemeClr val="tx1"/>
+                        </a:solidFill>
+                      </a:endParaRPr>
                     </a:p>
                   </a:txBody>
                   <a:tcPr/>
@@ -10087,7 +10304,6 @@
                         <a:rPr lang="en-AU" sz="1600" dirty="0" smtClean="0"/>
                         <a:t>Southern Metro</a:t>
                       </a:r>
-                      <a:endParaRPr lang="en-AU" sz="1600" dirty="0" smtClean="0"/>
                     </a:p>
                   </a:txBody>
                   <a:tcPr/>
@@ -10114,8 +10330,57 @@
                     <a:p>
                       <a:pPr algn="ctr"/>
                       <a:r>
+                        <a:rPr lang="en-US" sz="1600" kern="1200" dirty="0" smtClean="0">
+                          <a:solidFill>
+                            <a:srgbClr val="FF0000"/>
+                          </a:solidFill>
+                          <a:latin typeface="Wingdings 3" pitchFamily="18" charset="2"/>
+                          <a:ea typeface="+mn-ea"/>
+                          <a:cs typeface="+mn-cs"/>
+                        </a:rPr>
+                        <a:t>Ÿ</a:t>
+                      </a:r>
+                      <a:r>
                         <a:rPr lang="en-AU" sz="1600" dirty="0" smtClean="0"/>
-                        <a:t>0.13, 0.42, 0.26</a:t>
+                        <a:t>0.13</a:t>
+                      </a:r>
+                      <a:r>
+                        <a:rPr lang="en-AU" sz="1600" dirty="0" smtClean="0"/>
+                        <a:t>, </a:t>
+                      </a:r>
+                      <a:r>
+                        <a:rPr lang="en-US" sz="1600" kern="1200" dirty="0" smtClean="0">
+                          <a:solidFill>
+                            <a:srgbClr val="FF0000"/>
+                          </a:solidFill>
+                          <a:latin typeface="Wingdings 3" pitchFamily="18" charset="2"/>
+                          <a:ea typeface="+mn-ea"/>
+                          <a:cs typeface="+mn-cs"/>
+                        </a:rPr>
+                        <a:t>Ÿ</a:t>
+                      </a:r>
+                      <a:r>
+                        <a:rPr lang="en-AU" sz="1600" dirty="0" smtClean="0"/>
+                        <a:t>0.42</a:t>
+                      </a:r>
+                      <a:r>
+                        <a:rPr lang="en-AU" sz="1600" dirty="0" smtClean="0"/>
+                        <a:t>, </a:t>
+                      </a:r>
+                      <a:r>
+                        <a:rPr lang="en-US" sz="1600" kern="1200" dirty="0" smtClean="0">
+                          <a:solidFill>
+                            <a:srgbClr val="FF0000"/>
+                          </a:solidFill>
+                          <a:latin typeface="Wingdings 3" pitchFamily="18" charset="2"/>
+                          <a:ea typeface="+mn-ea"/>
+                          <a:cs typeface="+mn-cs"/>
+                        </a:rPr>
+                        <a:t>Ÿ</a:t>
+                      </a:r>
+                      <a:r>
+                        <a:rPr lang="en-AU" sz="1600" dirty="0" smtClean="0"/>
+                        <a:t>0.26</a:t>
                       </a:r>
                       <a:endParaRPr lang="en-US" sz="1600" dirty="0"/>
                     </a:p>
@@ -10165,7 +10430,19 @@
                       <a:pPr algn="ctr"/>
                       <a:r>
                         <a:rPr lang="en-AU" sz="1600" dirty="0" smtClean="0"/>
-                        <a:t>2013, 2014, 2017, 2019</a:t>
+                        <a:t>2013, 2014, </a:t>
+                      </a:r>
+                      <a:r>
+                        <a:rPr lang="en-AU" sz="1600" dirty="0" smtClean="0">
+                          <a:solidFill>
+                            <a:srgbClr val="00B050"/>
+                          </a:solidFill>
+                        </a:rPr>
+                        <a:t>2017</a:t>
+                      </a:r>
+                      <a:r>
+                        <a:rPr lang="en-AU" sz="1600" dirty="0" smtClean="0"/>
+                        <a:t>, 2019</a:t>
                       </a:r>
                       <a:endParaRPr lang="en-US" sz="1600" dirty="0"/>
                     </a:p>
@@ -10179,8 +10456,76 @@
                     <a:p>
                       <a:pPr algn="ctr"/>
                       <a:r>
+                        <a:rPr lang="en-US" sz="1600" kern="1200" dirty="0" smtClean="0">
+                          <a:solidFill>
+                            <a:srgbClr val="FF0000"/>
+                          </a:solidFill>
+                          <a:latin typeface="Wingdings 3" pitchFamily="18" charset="2"/>
+                          <a:ea typeface="+mn-ea"/>
+                          <a:cs typeface="+mn-cs"/>
+                        </a:rPr>
+                        <a:t>Ÿ</a:t>
+                      </a:r>
+                      <a:r>
                         <a:rPr lang="en-AU" sz="1600" dirty="0" smtClean="0"/>
-                        <a:t>0.02, 0.05, -0.04, 0.08</a:t>
+                        <a:t>0.02</a:t>
+                      </a:r>
+                      <a:r>
+                        <a:rPr lang="en-AU" sz="1600" dirty="0" smtClean="0"/>
+                        <a:t>, </a:t>
+                      </a:r>
+                      <a:r>
+                        <a:rPr lang="en-US" sz="1600" kern="1200" dirty="0" smtClean="0">
+                          <a:solidFill>
+                            <a:srgbClr val="FF0000"/>
+                          </a:solidFill>
+                          <a:latin typeface="Wingdings 3" pitchFamily="18" charset="2"/>
+                          <a:ea typeface="+mn-ea"/>
+                          <a:cs typeface="+mn-cs"/>
+                        </a:rPr>
+                        <a:t>Ÿ</a:t>
+                      </a:r>
+                      <a:r>
+                        <a:rPr lang="en-AU" sz="1600" dirty="0" smtClean="0"/>
+                        <a:t>0.05</a:t>
+                      </a:r>
+                      <a:r>
+                        <a:rPr lang="en-AU" sz="1600" dirty="0" smtClean="0"/>
+                        <a:t>, </a:t>
+                      </a:r>
+                      <a:r>
+                        <a:rPr lang="en-US" sz="1600" kern="1200" dirty="0" smtClean="0">
+                          <a:solidFill>
+                            <a:srgbClr val="00B050"/>
+                          </a:solidFill>
+                          <a:latin typeface="Wingdings 3" pitchFamily="18" charset="2"/>
+                          <a:ea typeface="+mn-ea"/>
+                          <a:cs typeface="+mn-cs"/>
+                        </a:rPr>
+                        <a:t>”</a:t>
+                      </a:r>
+                      <a:r>
+                        <a:rPr lang="en-AU" sz="1600" dirty="0" smtClean="0"/>
+                        <a:t>-</a:t>
+                      </a:r>
+                      <a:r>
+                        <a:rPr lang="en-AU" sz="1600" dirty="0" smtClean="0"/>
+                        <a:t>0.04, </a:t>
+                      </a:r>
+                      <a:r>
+                        <a:rPr lang="en-US" sz="1600" kern="1200" dirty="0" smtClean="0">
+                          <a:solidFill>
+                            <a:srgbClr val="FF0000"/>
+                          </a:solidFill>
+                          <a:latin typeface="Wingdings 3" pitchFamily="18" charset="2"/>
+                          <a:ea typeface="+mn-ea"/>
+                          <a:cs typeface="+mn-cs"/>
+                        </a:rPr>
+                        <a:t>Ÿ</a:t>
+                      </a:r>
+                      <a:r>
+                        <a:rPr lang="en-AU" sz="1600" dirty="0" smtClean="0"/>
+                        <a:t>0.08</a:t>
                       </a:r>
                       <a:endParaRPr lang="en-US" sz="1600" dirty="0"/>
                     </a:p>
@@ -10286,26 +10631,73 @@
                     <a:p>
                       <a:pPr algn="ctr"/>
                       <a:r>
+                        <a:rPr lang="en-US" sz="1600" kern="1200" dirty="0" smtClean="0">
+                          <a:solidFill>
+                            <a:srgbClr val="FF0000"/>
+                          </a:solidFill>
+                          <a:latin typeface="Wingdings 3" pitchFamily="18" charset="2"/>
+                          <a:ea typeface="+mn-ea"/>
+                          <a:cs typeface="+mn-cs"/>
+                        </a:rPr>
+                        <a:t>Ÿ</a:t>
+                      </a:r>
+                      <a:r>
                         <a:rPr lang="en-AU" sz="1600" dirty="0" smtClean="0"/>
                         <a:t>0.08</a:t>
                       </a:r>
+                      <a:endParaRPr lang="en-AU" sz="1600" dirty="0" smtClean="0"/>
                     </a:p>
                     <a:p>
                       <a:pPr algn="ctr"/>
                       <a:r>
+                        <a:rPr lang="en-US" sz="1600" kern="1200" dirty="0" smtClean="0">
+                          <a:solidFill>
+                            <a:srgbClr val="FF0000"/>
+                          </a:solidFill>
+                          <a:latin typeface="Wingdings 3" pitchFamily="18" charset="2"/>
+                          <a:ea typeface="+mn-ea"/>
+                          <a:cs typeface="+mn-cs"/>
+                        </a:rPr>
+                        <a:t>Ÿ</a:t>
+                      </a:r>
+                      <a:r>
                         <a:rPr lang="en-AU" sz="1600" dirty="0" smtClean="0"/>
                         <a:t>0.09</a:t>
                       </a:r>
+                      <a:endParaRPr lang="en-AU" sz="1600" dirty="0" smtClean="0"/>
                     </a:p>
                     <a:p>
                       <a:pPr algn="ctr"/>
                       <a:r>
+                        <a:rPr lang="en-US" sz="1600" kern="1200" dirty="0" smtClean="0">
+                          <a:solidFill>
+                            <a:srgbClr val="FF0000"/>
+                          </a:solidFill>
+                          <a:latin typeface="Wingdings 3" pitchFamily="18" charset="2"/>
+                          <a:ea typeface="+mn-ea"/>
+                          <a:cs typeface="+mn-cs"/>
+                        </a:rPr>
+                        <a:t>Ÿ</a:t>
+                      </a:r>
+                      <a:r>
                         <a:rPr lang="en-AU" sz="1600" dirty="0" smtClean="0"/>
                         <a:t>0.13</a:t>
                       </a:r>
+                      <a:endParaRPr lang="en-AU" sz="1600" dirty="0" smtClean="0"/>
                     </a:p>
                     <a:p>
                       <a:pPr algn="ctr"/>
+                      <a:r>
+                        <a:rPr lang="en-US" sz="1600" kern="1200" dirty="0" smtClean="0">
+                          <a:solidFill>
+                            <a:srgbClr val="FF0000"/>
+                          </a:solidFill>
+                          <a:latin typeface="Wingdings 3" pitchFamily="18" charset="2"/>
+                          <a:ea typeface="+mn-ea"/>
+                          <a:cs typeface="+mn-cs"/>
+                        </a:rPr>
+                        <a:t>Ÿ</a:t>
+                      </a:r>
                       <a:r>
                         <a:rPr lang="en-AU" sz="1600" dirty="0" smtClean="0"/>
                         <a:t>0.07</a:t>
@@ -10323,7 +10715,7 @@
     </p:spTree>
     <p:extLst>
       <p:ext uri="{BB962C8B-B14F-4D97-AF65-F5344CB8AC3E}">
-        <p14:creationId xmlns:p14="http://schemas.microsoft.com/office/powerpoint/2010/main" xmlns="" val="4047589959"/>
+        <p14:creationId xmlns="" xmlns:p14="http://schemas.microsoft.com/office/powerpoint/2010/main" val="4047589959"/>
       </p:ext>
     </p:extLst>
   </p:cSld>
@@ -10535,7 +10927,7 @@
   <a:extraClrSchemeLst/>
   <a:extLst>
     <a:ext uri="{05A4C25C-085E-4340-85A3-A5531E510DB2}">
-      <thm15:themeFamily xmlns:thm15="http://schemas.microsoft.com/office/thememl/2012/main" xmlns="" name="BohemianVTI" id="{B5E50611-F7C7-47BC-81A6-BE9493DF8677}" vid="{7A26D0DD-A1A5-444B-B0FB-E7DB9E2D047F}"/>
+      <thm15:themeFamily xmlns="" xmlns:thm15="http://schemas.microsoft.com/office/thememl/2012/main" name="BohemianVTI" id="{B5E50611-F7C7-47BC-81A6-BE9493DF8677}" vid="{7A26D0DD-A1A5-444B-B0FB-E7DB9E2D047F}"/>
     </a:ext>
   </a:extLst>
 </a:theme>
@@ -10830,7 +11222,7 @@
   <a:extraClrSchemeLst/>
   <a:extLst>
     <a:ext uri="{05A4C25C-085E-4340-85A3-A5531E510DB2}">
-      <thm15:themeFamily xmlns:thm15="http://schemas.microsoft.com/office/thememl/2012/main" xmlns="" name="Office Theme" id="{62F939B6-93AF-4DB8-9C6B-D6C7DFDC589F}" vid="{4A3C46E8-61CC-4603-A589-7422A47A8E4A}"/>
+      <thm15:themeFamily xmlns="" xmlns:thm15="http://schemas.microsoft.com/office/thememl/2012/main" name="Office Theme" id="{62F939B6-93AF-4DB8-9C6B-D6C7DFDC589F}" vid="{4A3C46E8-61CC-4603-A589-7422A47A8E4A}"/>
     </a:ext>
   </a:extLst>
 </a:theme>

</xml_diff>